<commit_message>
update figs and start filling in some missing figure references throughout ms
</commit_message>
<xml_diff>
--- a/working_drafts/figs/TXeco_fig3_SEM.pptx
+++ b/working_drafts/figs/TXeco_fig3_SEM.pptx
@@ -5,7 +5,7 @@
     <p:sldMasterId id="2147483708" r:id="rId1"/>
   </p:sldMasterIdLst>
   <p:notesMasterIdLst>
-    <p:notesMasterId r:id="rId9"/>
+    <p:notesMasterId r:id="rId10"/>
   </p:notesMasterIdLst>
   <p:sldIdLst>
     <p:sldId id="276" r:id="rId2"/>
@@ -15,6 +15,7 @@
     <p:sldId id="284" r:id="rId6"/>
     <p:sldId id="285" r:id="rId7"/>
     <p:sldId id="287" r:id="rId8"/>
+    <p:sldId id="288" r:id="rId9"/>
   </p:sldIdLst>
   <p:sldSz cx="27432000" cy="18288000"/>
   <p:notesSz cx="6858000" cy="9144000"/>
@@ -203,7 +204,7 @@
           <a:p>
             <a:fld id="{9C8338E3-F40D-F146-8D3B-4726E84D5200}" type="datetimeFigureOut">
               <a:rPr lang="en-US" smtClean="0"/>
-              <a:t>10/14/24</a:t>
+              <a:t>2/25/25</a:t>
             </a:fld>
             <a:endParaRPr lang="en-US"/>
           </a:p>
@@ -1063,6 +1064,114 @@
 </p:notes>
 </file>
 
+<file path=ppt/notesSlides/notesSlide8.xml><?xml version="1.0" encoding="utf-8"?>
+<p:notes xmlns:a="http://schemas.openxmlformats.org/drawingml/2006/main" xmlns:r="http://schemas.openxmlformats.org/officeDocument/2006/relationships" xmlns:p="http://schemas.openxmlformats.org/presentationml/2006/main">
+  <p:cSld>
+    <p:spTree>
+      <p:nvGrpSpPr>
+        <p:cNvPr id="1" name="">
+          <a:extLst>
+            <a:ext uri="{FF2B5EF4-FFF2-40B4-BE49-F238E27FC236}">
+              <a16:creationId xmlns:a16="http://schemas.microsoft.com/office/drawing/2014/main" id="{6BF8829C-A3DA-02ED-AC6F-90C141BD3A31}"/>
+            </a:ext>
+          </a:extLst>
+        </p:cNvPr>
+        <p:cNvGrpSpPr/>
+        <p:nvPr/>
+      </p:nvGrpSpPr>
+      <p:grpSpPr>
+        <a:xfrm>
+          <a:off x="0" y="0"/>
+          <a:ext cx="0" cy="0"/>
+          <a:chOff x="0" y="0"/>
+          <a:chExt cx="0" cy="0"/>
+        </a:xfrm>
+      </p:grpSpPr>
+      <p:sp>
+        <p:nvSpPr>
+          <p:cNvPr id="2" name="Slide Image Placeholder 1">
+            <a:extLst>
+              <a:ext uri="{FF2B5EF4-FFF2-40B4-BE49-F238E27FC236}">
+                <a16:creationId xmlns:a16="http://schemas.microsoft.com/office/drawing/2014/main" id="{C6FD7B2A-7022-898A-52BC-6970285F37C0}"/>
+              </a:ext>
+            </a:extLst>
+          </p:cNvPr>
+          <p:cNvSpPr>
+            <a:spLocks noGrp="1" noRot="1" noChangeAspect="1"/>
+          </p:cNvSpPr>
+          <p:nvPr>
+            <p:ph type="sldImg"/>
+          </p:nvPr>
+        </p:nvSpPr>
+        <p:spPr/>
+      </p:sp>
+      <p:sp>
+        <p:nvSpPr>
+          <p:cNvPr id="3" name="Notes Placeholder 2">
+            <a:extLst>
+              <a:ext uri="{FF2B5EF4-FFF2-40B4-BE49-F238E27FC236}">
+                <a16:creationId xmlns:a16="http://schemas.microsoft.com/office/drawing/2014/main" id="{A346A378-144F-D4D9-5BFF-22F5AE76645A}"/>
+              </a:ext>
+            </a:extLst>
+          </p:cNvPr>
+          <p:cNvSpPr>
+            <a:spLocks noGrp="1"/>
+          </p:cNvSpPr>
+          <p:nvPr>
+            <p:ph type="body" idx="1"/>
+          </p:nvPr>
+        </p:nvSpPr>
+        <p:spPr/>
+        <p:txBody>
+          <a:bodyPr/>
+          <a:lstStyle/>
+          <a:p>
+            <a:endParaRPr lang="en-US" dirty="0"/>
+          </a:p>
+        </p:txBody>
+      </p:sp>
+      <p:sp>
+        <p:nvSpPr>
+          <p:cNvPr id="4" name="Slide Number Placeholder 3">
+            <a:extLst>
+              <a:ext uri="{FF2B5EF4-FFF2-40B4-BE49-F238E27FC236}">
+                <a16:creationId xmlns:a16="http://schemas.microsoft.com/office/drawing/2014/main" id="{C1C178DE-AD1C-E59B-5E28-F3D7FBD69358}"/>
+              </a:ext>
+            </a:extLst>
+          </p:cNvPr>
+          <p:cNvSpPr>
+            <a:spLocks noGrp="1"/>
+          </p:cNvSpPr>
+          <p:nvPr>
+            <p:ph type="sldNum" sz="quarter" idx="5"/>
+          </p:nvPr>
+        </p:nvSpPr>
+        <p:spPr/>
+        <p:txBody>
+          <a:bodyPr/>
+          <a:lstStyle/>
+          <a:p>
+            <a:fld id="{C2800238-33D2-A44F-8135-A0F534DB873D}" type="slidenum">
+              <a:rPr lang="en-US" smtClean="0"/>
+              <a:t>8</a:t>
+            </a:fld>
+            <a:endParaRPr lang="en-US"/>
+          </a:p>
+        </p:txBody>
+      </p:sp>
+    </p:spTree>
+    <p:extLst>
+      <p:ext uri="{BB962C8B-B14F-4D97-AF65-F5344CB8AC3E}">
+        <p14:creationId xmlns:p14="http://schemas.microsoft.com/office/powerpoint/2010/main" val="2069246414"/>
+      </p:ext>
+    </p:extLst>
+  </p:cSld>
+  <p:clrMapOvr>
+    <a:masterClrMapping/>
+  </p:clrMapOvr>
+</p:notes>
+</file>
+
 <file path=ppt/slideLayouts/slideLayout1.xml><?xml version="1.0" encoding="utf-8"?>
 <p:sldLayout xmlns:a="http://schemas.openxmlformats.org/drawingml/2006/main" xmlns:r="http://schemas.openxmlformats.org/officeDocument/2006/relationships" xmlns:p="http://schemas.openxmlformats.org/presentationml/2006/main" type="title" preserve="1">
   <p:cSld name="Title Slide">
@@ -1194,7 +1303,7 @@
           <a:p>
             <a:fld id="{D3A28AA4-801E-B147-9E5C-6E6DBA6E23D1}" type="datetimeFigureOut">
               <a:rPr lang="en-US" smtClean="0"/>
-              <a:t>10/14/24</a:t>
+              <a:t>2/25/25</a:t>
             </a:fld>
             <a:endParaRPr lang="en-US"/>
           </a:p>
@@ -1364,7 +1473,7 @@
           <a:p>
             <a:fld id="{D3A28AA4-801E-B147-9E5C-6E6DBA6E23D1}" type="datetimeFigureOut">
               <a:rPr lang="en-US" smtClean="0"/>
-              <a:t>10/14/24</a:t>
+              <a:t>2/25/25</a:t>
             </a:fld>
             <a:endParaRPr lang="en-US"/>
           </a:p>
@@ -1544,7 +1653,7 @@
           <a:p>
             <a:fld id="{D3A28AA4-801E-B147-9E5C-6E6DBA6E23D1}" type="datetimeFigureOut">
               <a:rPr lang="en-US" smtClean="0"/>
-              <a:t>10/14/24</a:t>
+              <a:t>2/25/25</a:t>
             </a:fld>
             <a:endParaRPr lang="en-US"/>
           </a:p>
@@ -1714,7 +1823,7 @@
           <a:p>
             <a:fld id="{D3A28AA4-801E-B147-9E5C-6E6DBA6E23D1}" type="datetimeFigureOut">
               <a:rPr lang="en-US" smtClean="0"/>
-              <a:t>10/14/24</a:t>
+              <a:t>2/25/25</a:t>
             </a:fld>
             <a:endParaRPr lang="en-US"/>
           </a:p>
@@ -1958,7 +2067,7 @@
           <a:p>
             <a:fld id="{D3A28AA4-801E-B147-9E5C-6E6DBA6E23D1}" type="datetimeFigureOut">
               <a:rPr lang="en-US" smtClean="0"/>
-              <a:t>10/14/24</a:t>
+              <a:t>2/25/25</a:t>
             </a:fld>
             <a:endParaRPr lang="en-US"/>
           </a:p>
@@ -2190,7 +2299,7 @@
           <a:p>
             <a:fld id="{D3A28AA4-801E-B147-9E5C-6E6DBA6E23D1}" type="datetimeFigureOut">
               <a:rPr lang="en-US" smtClean="0"/>
-              <a:t>10/14/24</a:t>
+              <a:t>2/25/25</a:t>
             </a:fld>
             <a:endParaRPr lang="en-US"/>
           </a:p>
@@ -2557,7 +2666,7 @@
           <a:p>
             <a:fld id="{D3A28AA4-801E-B147-9E5C-6E6DBA6E23D1}" type="datetimeFigureOut">
               <a:rPr lang="en-US" smtClean="0"/>
-              <a:t>10/14/24</a:t>
+              <a:t>2/25/25</a:t>
             </a:fld>
             <a:endParaRPr lang="en-US"/>
           </a:p>
@@ -2675,7 +2784,7 @@
           <a:p>
             <a:fld id="{D3A28AA4-801E-B147-9E5C-6E6DBA6E23D1}" type="datetimeFigureOut">
               <a:rPr lang="en-US" smtClean="0"/>
-              <a:t>10/14/24</a:t>
+              <a:t>2/25/25</a:t>
             </a:fld>
             <a:endParaRPr lang="en-US"/>
           </a:p>
@@ -2770,7 +2879,7 @@
           <a:p>
             <a:fld id="{D3A28AA4-801E-B147-9E5C-6E6DBA6E23D1}" type="datetimeFigureOut">
               <a:rPr lang="en-US" smtClean="0"/>
-              <a:t>10/14/24</a:t>
+              <a:t>2/25/25</a:t>
             </a:fld>
             <a:endParaRPr lang="en-US"/>
           </a:p>
@@ -3047,7 +3156,7 @@
           <a:p>
             <a:fld id="{D3A28AA4-801E-B147-9E5C-6E6DBA6E23D1}" type="datetimeFigureOut">
               <a:rPr lang="en-US" smtClean="0"/>
-              <a:t>10/14/24</a:t>
+              <a:t>2/25/25</a:t>
             </a:fld>
             <a:endParaRPr lang="en-US"/>
           </a:p>
@@ -3304,7 +3413,7 @@
           <a:p>
             <a:fld id="{D3A28AA4-801E-B147-9E5C-6E6DBA6E23D1}" type="datetimeFigureOut">
               <a:rPr lang="en-US" smtClean="0"/>
-              <a:t>10/14/24</a:t>
+              <a:t>2/25/25</a:t>
             </a:fld>
             <a:endParaRPr lang="en-US"/>
           </a:p>
@@ -3517,7 +3626,7 @@
           <a:p>
             <a:fld id="{D3A28AA4-801E-B147-9E5C-6E6DBA6E23D1}" type="datetimeFigureOut">
               <a:rPr lang="en-US" smtClean="0"/>
-              <a:t>10/14/24</a:t>
+              <a:t>2/25/25</a:t>
             </a:fld>
             <a:endParaRPr lang="en-US"/>
           </a:p>
@@ -27623,6 +27732,3867 @@
 </p:sld>
 </file>
 
+<file path=ppt/slides/slide8.xml><?xml version="1.0" encoding="utf-8"?>
+<p:sld xmlns:a="http://schemas.openxmlformats.org/drawingml/2006/main" xmlns:r="http://schemas.openxmlformats.org/officeDocument/2006/relationships" xmlns:p="http://schemas.openxmlformats.org/presentationml/2006/main">
+  <p:cSld>
+    <p:spTree>
+      <p:nvGrpSpPr>
+        <p:cNvPr id="1" name="">
+          <a:extLst>
+            <a:ext uri="{FF2B5EF4-FFF2-40B4-BE49-F238E27FC236}">
+              <a16:creationId xmlns:a16="http://schemas.microsoft.com/office/drawing/2014/main" id="{13D51409-B14F-E6E7-6114-F7815B019573}"/>
+            </a:ext>
+          </a:extLst>
+        </p:cNvPr>
+        <p:cNvGrpSpPr/>
+        <p:nvPr/>
+      </p:nvGrpSpPr>
+      <p:grpSpPr>
+        <a:xfrm>
+          <a:off x="0" y="0"/>
+          <a:ext cx="0" cy="0"/>
+          <a:chOff x="0" y="0"/>
+          <a:chExt cx="0" cy="0"/>
+        </a:xfrm>
+      </p:grpSpPr>
+      <p:sp>
+        <p:nvSpPr>
+          <p:cNvPr id="109" name="Rectangle 108">
+            <a:extLst>
+              <a:ext uri="{FF2B5EF4-FFF2-40B4-BE49-F238E27FC236}">
+                <a16:creationId xmlns:a16="http://schemas.microsoft.com/office/drawing/2014/main" id="{158844DB-6AF2-5B4E-C359-7BB5751F5E0E}"/>
+              </a:ext>
+            </a:extLst>
+          </p:cNvPr>
+          <p:cNvSpPr/>
+          <p:nvPr/>
+        </p:nvSpPr>
+        <p:spPr>
+          <a:xfrm>
+            <a:off x="6986016" y="1298448"/>
+            <a:ext cx="14356080" cy="6638544"/>
+          </a:xfrm>
+          <a:prstGeom prst="rect">
+            <a:avLst/>
+          </a:prstGeom>
+          <a:solidFill>
+            <a:schemeClr val="bg1">
+              <a:lumMod val="95000"/>
+            </a:schemeClr>
+          </a:solidFill>
+          <a:ln w="57150">
+            <a:solidFill>
+              <a:schemeClr val="bg1">
+                <a:lumMod val="50000"/>
+              </a:schemeClr>
+            </a:solidFill>
+          </a:ln>
+        </p:spPr>
+        <p:style>
+          <a:lnRef idx="2">
+            <a:schemeClr val="accent1">
+              <a:shade val="15000"/>
+            </a:schemeClr>
+          </a:lnRef>
+          <a:fillRef idx="1">
+            <a:schemeClr val="accent1"/>
+          </a:fillRef>
+          <a:effectRef idx="0">
+            <a:schemeClr val="accent1"/>
+          </a:effectRef>
+          <a:fontRef idx="minor">
+            <a:schemeClr val="lt1"/>
+          </a:fontRef>
+        </p:style>
+        <p:txBody>
+          <a:bodyPr rtlCol="0" anchor="ctr"/>
+          <a:lstStyle/>
+          <a:p>
+            <a:pPr algn="ctr"/>
+            <a:endParaRPr lang="en-US"/>
+          </a:p>
+        </p:txBody>
+      </p:sp>
+      <p:cxnSp>
+        <p:nvCxnSpPr>
+          <p:cNvPr id="3" name="Straight Arrow Connector 2">
+            <a:extLst>
+              <a:ext uri="{FF2B5EF4-FFF2-40B4-BE49-F238E27FC236}">
+                <a16:creationId xmlns:a16="http://schemas.microsoft.com/office/drawing/2014/main" id="{A7467FDC-0E82-6612-7C35-0C4B5FA0403F}"/>
+              </a:ext>
+            </a:extLst>
+          </p:cNvPr>
+          <p:cNvCxnSpPr/>
+          <p:nvPr/>
+        </p:nvCxnSpPr>
+        <p:spPr>
+          <a:xfrm>
+            <a:off x="10917424" y="3886200"/>
+            <a:ext cx="5663364" cy="0"/>
+          </a:xfrm>
+          <a:prstGeom prst="straightConnector1">
+            <a:avLst/>
+          </a:prstGeom>
+          <a:ln w="23749">
+            <a:solidFill>
+              <a:schemeClr val="accent1">
+                <a:lumMod val="75000"/>
+              </a:schemeClr>
+            </a:solidFill>
+            <a:tailEnd type="triangle"/>
+          </a:ln>
+        </p:spPr>
+        <p:style>
+          <a:lnRef idx="1">
+            <a:schemeClr val="accent1"/>
+          </a:lnRef>
+          <a:fillRef idx="0">
+            <a:schemeClr val="accent1"/>
+          </a:fillRef>
+          <a:effectRef idx="0">
+            <a:schemeClr val="accent1"/>
+          </a:effectRef>
+          <a:fontRef idx="minor">
+            <a:schemeClr val="tx1"/>
+          </a:fontRef>
+        </p:style>
+      </p:cxnSp>
+      <p:cxnSp>
+        <p:nvCxnSpPr>
+          <p:cNvPr id="38" name="Straight Connector 37">
+            <a:extLst>
+              <a:ext uri="{FF2B5EF4-FFF2-40B4-BE49-F238E27FC236}">
+                <a16:creationId xmlns:a16="http://schemas.microsoft.com/office/drawing/2014/main" id="{1E181639-44C6-3E90-8AD2-3F54A3C6743C}"/>
+              </a:ext>
+            </a:extLst>
+          </p:cNvPr>
+          <p:cNvCxnSpPr>
+            <a:cxnSpLocks/>
+          </p:cNvCxnSpPr>
+          <p:nvPr/>
+        </p:nvCxnSpPr>
+        <p:spPr>
+          <a:xfrm>
+            <a:off x="16971420" y="16761203"/>
+            <a:ext cx="0" cy="0"/>
+          </a:xfrm>
+          <a:prstGeom prst="line">
+            <a:avLst/>
+          </a:prstGeom>
+          <a:ln w="6350">
+            <a:solidFill>
+              <a:schemeClr val="tx1"/>
+            </a:solidFill>
+            <a:prstDash val="dash"/>
+          </a:ln>
+        </p:spPr>
+        <p:style>
+          <a:lnRef idx="1">
+            <a:schemeClr val="accent1"/>
+          </a:lnRef>
+          <a:fillRef idx="0">
+            <a:schemeClr val="accent1"/>
+          </a:fillRef>
+          <a:effectRef idx="0">
+            <a:schemeClr val="accent1"/>
+          </a:effectRef>
+          <a:fontRef idx="minor">
+            <a:schemeClr val="tx1"/>
+          </a:fontRef>
+        </p:style>
+      </p:cxnSp>
+      <p:cxnSp>
+        <p:nvCxnSpPr>
+          <p:cNvPr id="5" name="Elbow Connector 4">
+            <a:extLst>
+              <a:ext uri="{FF2B5EF4-FFF2-40B4-BE49-F238E27FC236}">
+                <a16:creationId xmlns:a16="http://schemas.microsoft.com/office/drawing/2014/main" id="{A3743FD9-A4EB-75AC-5782-FB440B42B1E4}"/>
+              </a:ext>
+            </a:extLst>
+          </p:cNvPr>
+          <p:cNvCxnSpPr>
+            <a:cxnSpLocks/>
+          </p:cNvCxnSpPr>
+          <p:nvPr/>
+        </p:nvCxnSpPr>
+        <p:spPr>
+          <a:xfrm flipV="1">
+            <a:off x="10007724" y="5357009"/>
+            <a:ext cx="1459355" cy="430652"/>
+          </a:xfrm>
+          <a:prstGeom prst="bentConnector3">
+            <a:avLst>
+              <a:gd name="adj1" fmla="val -11"/>
+            </a:avLst>
+          </a:prstGeom>
+          <a:ln w="30861">
+            <a:solidFill>
+              <a:srgbClr val="C00000"/>
+            </a:solidFill>
+            <a:headEnd type="oval"/>
+            <a:tailEnd type="triangle"/>
+          </a:ln>
+        </p:spPr>
+        <p:style>
+          <a:lnRef idx="1">
+            <a:schemeClr val="accent1"/>
+          </a:lnRef>
+          <a:fillRef idx="0">
+            <a:schemeClr val="accent1"/>
+          </a:fillRef>
+          <a:effectRef idx="0">
+            <a:schemeClr val="accent1"/>
+          </a:effectRef>
+          <a:fontRef idx="minor">
+            <a:schemeClr val="tx1"/>
+          </a:fontRef>
+        </p:style>
+      </p:cxnSp>
+      <p:cxnSp>
+        <p:nvCxnSpPr>
+          <p:cNvPr id="6" name="Straight Arrow Connector 5">
+            <a:extLst>
+              <a:ext uri="{FF2B5EF4-FFF2-40B4-BE49-F238E27FC236}">
+                <a16:creationId xmlns:a16="http://schemas.microsoft.com/office/drawing/2014/main" id="{FFAAC4F6-1331-F376-EC55-E4D400A5E875}"/>
+              </a:ext>
+            </a:extLst>
+          </p:cNvPr>
+          <p:cNvCxnSpPr>
+            <a:cxnSpLocks/>
+          </p:cNvCxnSpPr>
+          <p:nvPr/>
+        </p:nvCxnSpPr>
+        <p:spPr>
+          <a:xfrm>
+            <a:off x="13286478" y="5164616"/>
+            <a:ext cx="892510" cy="0"/>
+          </a:xfrm>
+          <a:prstGeom prst="straightConnector1">
+            <a:avLst/>
+          </a:prstGeom>
+          <a:ln w="128270">
+            <a:solidFill>
+              <a:schemeClr val="accent1">
+                <a:lumMod val="75000"/>
+              </a:schemeClr>
+            </a:solidFill>
+            <a:tailEnd type="triangle"/>
+          </a:ln>
+        </p:spPr>
+        <p:style>
+          <a:lnRef idx="1">
+            <a:schemeClr val="accent1"/>
+          </a:lnRef>
+          <a:fillRef idx="0">
+            <a:schemeClr val="accent1"/>
+          </a:fillRef>
+          <a:effectRef idx="0">
+            <a:schemeClr val="accent1"/>
+          </a:effectRef>
+          <a:fontRef idx="minor">
+            <a:schemeClr val="tx1"/>
+          </a:fontRef>
+        </p:style>
+      </p:cxnSp>
+      <p:cxnSp>
+        <p:nvCxnSpPr>
+          <p:cNvPr id="8" name="Elbow Connector 7">
+            <a:extLst>
+              <a:ext uri="{FF2B5EF4-FFF2-40B4-BE49-F238E27FC236}">
+                <a16:creationId xmlns:a16="http://schemas.microsoft.com/office/drawing/2014/main" id="{52E59A82-2572-9B8F-4B43-B3C035FBFED3}"/>
+              </a:ext>
+            </a:extLst>
+          </p:cNvPr>
+          <p:cNvCxnSpPr>
+            <a:cxnSpLocks/>
+          </p:cNvCxnSpPr>
+          <p:nvPr/>
+        </p:nvCxnSpPr>
+        <p:spPr>
+          <a:xfrm rot="5400000" flipH="1" flipV="1">
+            <a:off x="15548873" y="3656508"/>
+            <a:ext cx="606296" cy="1504990"/>
+          </a:xfrm>
+          <a:prstGeom prst="bentConnector2">
+            <a:avLst/>
+          </a:prstGeom>
+          <a:ln w="32766">
+            <a:solidFill>
+              <a:srgbClr val="C00000"/>
+            </a:solidFill>
+            <a:headEnd type="oval"/>
+            <a:tailEnd type="triangle"/>
+          </a:ln>
+        </p:spPr>
+        <p:style>
+          <a:lnRef idx="1">
+            <a:schemeClr val="accent1"/>
+          </a:lnRef>
+          <a:fillRef idx="0">
+            <a:schemeClr val="accent1"/>
+          </a:fillRef>
+          <a:effectRef idx="0">
+            <a:schemeClr val="accent1"/>
+          </a:effectRef>
+          <a:fontRef idx="minor">
+            <a:schemeClr val="tx1"/>
+          </a:fontRef>
+        </p:style>
+      </p:cxnSp>
+      <p:cxnSp>
+        <p:nvCxnSpPr>
+          <p:cNvPr id="9" name="Elbow Connector 8">
+            <a:extLst>
+              <a:ext uri="{FF2B5EF4-FFF2-40B4-BE49-F238E27FC236}">
+                <a16:creationId xmlns:a16="http://schemas.microsoft.com/office/drawing/2014/main" id="{2011B630-F53B-BF5A-0E17-DD51D308E5C5}"/>
+              </a:ext>
+            </a:extLst>
+          </p:cNvPr>
+          <p:cNvCxnSpPr>
+            <a:cxnSpLocks/>
+          </p:cNvCxnSpPr>
+          <p:nvPr/>
+        </p:nvCxnSpPr>
+        <p:spPr>
+          <a:xfrm rot="16200000" flipH="1">
+            <a:off x="15534744" y="5184051"/>
+            <a:ext cx="634555" cy="1504991"/>
+          </a:xfrm>
+          <a:prstGeom prst="bentConnector2">
+            <a:avLst/>
+          </a:prstGeom>
+          <a:ln w="46101">
+            <a:solidFill>
+              <a:srgbClr val="C00000"/>
+            </a:solidFill>
+            <a:headEnd type="oval"/>
+            <a:tailEnd type="triangle"/>
+          </a:ln>
+        </p:spPr>
+        <p:style>
+          <a:lnRef idx="1">
+            <a:schemeClr val="accent1"/>
+          </a:lnRef>
+          <a:fillRef idx="0">
+            <a:schemeClr val="accent1"/>
+          </a:fillRef>
+          <a:effectRef idx="0">
+            <a:schemeClr val="accent1"/>
+          </a:effectRef>
+          <a:fontRef idx="minor">
+            <a:schemeClr val="tx1"/>
+          </a:fontRef>
+        </p:style>
+      </p:cxnSp>
+      <p:cxnSp>
+        <p:nvCxnSpPr>
+          <p:cNvPr id="10" name="Elbow Connector 9">
+            <a:extLst>
+              <a:ext uri="{FF2B5EF4-FFF2-40B4-BE49-F238E27FC236}">
+                <a16:creationId xmlns:a16="http://schemas.microsoft.com/office/drawing/2014/main" id="{5A56F9CB-4342-ECD5-9838-DB34E4CAEC54}"/>
+              </a:ext>
+            </a:extLst>
+          </p:cNvPr>
+          <p:cNvCxnSpPr>
+            <a:cxnSpLocks/>
+            <a:stCxn id="19" idx="0"/>
+            <a:endCxn id="17" idx="0"/>
+          </p:cNvCxnSpPr>
+          <p:nvPr/>
+        </p:nvCxnSpPr>
+        <p:spPr>
+          <a:xfrm rot="16200000" flipH="1">
+            <a:off x="18122024" y="3090064"/>
+            <a:ext cx="1061295" cy="2276912"/>
+          </a:xfrm>
+          <a:prstGeom prst="bentConnector3">
+            <a:avLst>
+              <a:gd name="adj1" fmla="val -21540"/>
+            </a:avLst>
+          </a:prstGeom>
+          <a:ln w="184658">
+            <a:solidFill>
+              <a:schemeClr val="accent1">
+                <a:lumMod val="75000"/>
+              </a:schemeClr>
+            </a:solidFill>
+            <a:tailEnd type="triangle"/>
+          </a:ln>
+        </p:spPr>
+        <p:style>
+          <a:lnRef idx="1">
+            <a:schemeClr val="accent1"/>
+          </a:lnRef>
+          <a:fillRef idx="0">
+            <a:schemeClr val="accent1"/>
+          </a:fillRef>
+          <a:effectRef idx="0">
+            <a:schemeClr val="accent1"/>
+          </a:effectRef>
+          <a:fontRef idx="minor">
+            <a:schemeClr val="tx1"/>
+          </a:fontRef>
+        </p:style>
+      </p:cxnSp>
+      <p:cxnSp>
+        <p:nvCxnSpPr>
+          <p:cNvPr id="11" name="Elbow Connector 10">
+            <a:extLst>
+              <a:ext uri="{FF2B5EF4-FFF2-40B4-BE49-F238E27FC236}">
+                <a16:creationId xmlns:a16="http://schemas.microsoft.com/office/drawing/2014/main" id="{62D3A01D-6C91-96F2-FD09-40C9E9E5D131}"/>
+              </a:ext>
+            </a:extLst>
+          </p:cNvPr>
+          <p:cNvCxnSpPr>
+            <a:cxnSpLocks/>
+            <a:stCxn id="18" idx="2"/>
+            <a:endCxn id="17" idx="2"/>
+          </p:cNvCxnSpPr>
+          <p:nvPr/>
+        </p:nvCxnSpPr>
+        <p:spPr>
+          <a:xfrm rot="5400000" flipH="1" flipV="1">
+            <a:off x="18132670" y="5017937"/>
+            <a:ext cx="1040003" cy="2276912"/>
+          </a:xfrm>
+          <a:prstGeom prst="bentConnector3">
+            <a:avLst>
+              <a:gd name="adj1" fmla="val -21981"/>
+            </a:avLst>
+          </a:prstGeom>
+          <a:ln w="196469">
+            <a:solidFill>
+              <a:schemeClr val="accent1">
+                <a:lumMod val="75000"/>
+              </a:schemeClr>
+            </a:solidFill>
+            <a:tailEnd type="triangle"/>
+          </a:ln>
+        </p:spPr>
+        <p:style>
+          <a:lnRef idx="1">
+            <a:schemeClr val="accent1"/>
+          </a:lnRef>
+          <a:fillRef idx="0">
+            <a:schemeClr val="accent1"/>
+          </a:fillRef>
+          <a:effectRef idx="0">
+            <a:schemeClr val="accent1"/>
+          </a:effectRef>
+          <a:fontRef idx="minor">
+            <a:schemeClr val="tx1"/>
+          </a:fontRef>
+        </p:style>
+      </p:cxnSp>
+      <p:sp>
+        <p:nvSpPr>
+          <p:cNvPr id="15" name="Rectangle 14">
+            <a:extLst>
+              <a:ext uri="{FF2B5EF4-FFF2-40B4-BE49-F238E27FC236}">
+                <a16:creationId xmlns:a16="http://schemas.microsoft.com/office/drawing/2014/main" id="{D832B281-49A2-A72A-F415-C6C4B5D9CD94}"/>
+              </a:ext>
+            </a:extLst>
+          </p:cNvPr>
+          <p:cNvSpPr/>
+          <p:nvPr/>
+        </p:nvSpPr>
+        <p:spPr>
+          <a:xfrm>
+            <a:off x="11467080" y="4736683"/>
+            <a:ext cx="1819398" cy="877223"/>
+          </a:xfrm>
+          <a:prstGeom prst="rect">
+            <a:avLst/>
+          </a:prstGeom>
+          <a:solidFill>
+            <a:schemeClr val="bg1"/>
+          </a:solidFill>
+          <a:ln w="38100">
+            <a:solidFill>
+              <a:schemeClr val="tx1"/>
+            </a:solidFill>
+          </a:ln>
+        </p:spPr>
+        <p:style>
+          <a:lnRef idx="2">
+            <a:schemeClr val="accent1">
+              <a:shade val="50000"/>
+            </a:schemeClr>
+          </a:lnRef>
+          <a:fillRef idx="1">
+            <a:schemeClr val="accent1"/>
+          </a:fillRef>
+          <a:effectRef idx="0">
+            <a:schemeClr val="accent1"/>
+          </a:effectRef>
+          <a:fontRef idx="minor">
+            <a:schemeClr val="lt1"/>
+          </a:fontRef>
+        </p:style>
+        <p:txBody>
+          <a:bodyPr rtlCol="0" anchor="ctr"/>
+          <a:lstStyle/>
+          <a:p>
+            <a:pPr algn="ctr"/>
+            <a:r>
+              <a:rPr lang="el-GR" sz="2400" b="1" i="1" dirty="0">
+                <a:solidFill>
+                  <a:schemeClr val="tx1"/>
+                </a:solidFill>
+                <a:latin typeface="Arial" panose="020B0604020202020204" pitchFamily="34" charset="0"/>
+                <a:cs typeface="Arial" panose="020B0604020202020204" pitchFamily="34" charset="0"/>
+              </a:rPr>
+              <a:t>β</a:t>
+            </a:r>
+            <a:endParaRPr lang="en-US" sz="2400" b="1" i="1" dirty="0">
+              <a:solidFill>
+                <a:schemeClr val="tx1"/>
+              </a:solidFill>
+              <a:latin typeface="Arial" panose="020B0604020202020204" pitchFamily="34" charset="0"/>
+              <a:cs typeface="Arial" panose="020B0604020202020204" pitchFamily="34" charset="0"/>
+            </a:endParaRPr>
+          </a:p>
+        </p:txBody>
+      </p:sp>
+      <p:sp>
+        <p:nvSpPr>
+          <p:cNvPr id="17" name="Rectangle 16">
+            <a:extLst>
+              <a:ext uri="{FF2B5EF4-FFF2-40B4-BE49-F238E27FC236}">
+                <a16:creationId xmlns:a16="http://schemas.microsoft.com/office/drawing/2014/main" id="{E119D60B-178F-8AA1-3613-556BB9B2D0AB}"/>
+              </a:ext>
+            </a:extLst>
+          </p:cNvPr>
+          <p:cNvSpPr/>
+          <p:nvPr/>
+        </p:nvSpPr>
+        <p:spPr>
+          <a:xfrm>
+            <a:off x="18881429" y="4759168"/>
+            <a:ext cx="1819398" cy="877223"/>
+          </a:xfrm>
+          <a:prstGeom prst="rect">
+            <a:avLst/>
+          </a:prstGeom>
+          <a:solidFill>
+            <a:schemeClr val="bg1"/>
+          </a:solidFill>
+          <a:ln w="38100">
+            <a:solidFill>
+              <a:schemeClr val="tx1"/>
+            </a:solidFill>
+          </a:ln>
+        </p:spPr>
+        <p:style>
+          <a:lnRef idx="2">
+            <a:schemeClr val="accent1">
+              <a:shade val="50000"/>
+            </a:schemeClr>
+          </a:lnRef>
+          <a:fillRef idx="1">
+            <a:schemeClr val="accent1"/>
+          </a:fillRef>
+          <a:effectRef idx="0">
+            <a:schemeClr val="accent1"/>
+          </a:effectRef>
+          <a:fontRef idx="minor">
+            <a:schemeClr val="lt1"/>
+          </a:fontRef>
+        </p:style>
+        <p:txBody>
+          <a:bodyPr rtlCol="0" anchor="ctr"/>
+          <a:lstStyle/>
+          <a:p>
+            <a:pPr algn="ctr"/>
+            <a:r>
+              <a:rPr lang="el-GR" sz="2400" b="1" i="1" dirty="0">
+                <a:solidFill>
+                  <a:schemeClr val="tx1"/>
+                </a:solidFill>
+                <a:latin typeface="Arial" panose="020B0604020202020204" pitchFamily="34" charset="0"/>
+                <a:cs typeface="Arial" panose="020B0604020202020204" pitchFamily="34" charset="0"/>
+              </a:rPr>
+              <a:t>Ν</a:t>
+            </a:r>
+            <a:r>
+              <a:rPr lang="en-US" sz="2400" b="1" baseline="-25000" dirty="0">
+                <a:solidFill>
+                  <a:schemeClr val="tx1"/>
+                </a:solidFill>
+                <a:latin typeface="Arial" panose="020B0604020202020204" pitchFamily="34" charset="0"/>
+                <a:cs typeface="Arial" panose="020B0604020202020204" pitchFamily="34" charset="0"/>
+              </a:rPr>
+              <a:t>area</a:t>
+            </a:r>
+            <a:endParaRPr lang="en-US" sz="2400" b="1" i="1" dirty="0">
+              <a:solidFill>
+                <a:schemeClr val="tx1"/>
+              </a:solidFill>
+              <a:latin typeface="Arial" panose="020B0604020202020204" pitchFamily="34" charset="0"/>
+              <a:cs typeface="Arial" panose="020B0604020202020204" pitchFamily="34" charset="0"/>
+            </a:endParaRPr>
+          </a:p>
+        </p:txBody>
+      </p:sp>
+      <p:cxnSp>
+        <p:nvCxnSpPr>
+          <p:cNvPr id="46" name="Straight Arrow Connector 45">
+            <a:extLst>
+              <a:ext uri="{FF2B5EF4-FFF2-40B4-BE49-F238E27FC236}">
+                <a16:creationId xmlns:a16="http://schemas.microsoft.com/office/drawing/2014/main" id="{FE4CC9F5-201B-76BD-C138-2774DED773A2}"/>
+              </a:ext>
+            </a:extLst>
+          </p:cNvPr>
+          <p:cNvCxnSpPr>
+            <a:cxnSpLocks/>
+          </p:cNvCxnSpPr>
+          <p:nvPr/>
+        </p:nvCxnSpPr>
+        <p:spPr>
+          <a:xfrm flipV="1">
+            <a:off x="11013433" y="6511433"/>
+            <a:ext cx="5591084" cy="10678"/>
+          </a:xfrm>
+          <a:prstGeom prst="straightConnector1">
+            <a:avLst/>
+          </a:prstGeom>
+          <a:ln w="59436">
+            <a:solidFill>
+              <a:srgbClr val="C00000"/>
+            </a:solidFill>
+            <a:headEnd type="oval"/>
+            <a:tailEnd type="triangle"/>
+          </a:ln>
+        </p:spPr>
+        <p:style>
+          <a:lnRef idx="1">
+            <a:schemeClr val="accent1"/>
+          </a:lnRef>
+          <a:fillRef idx="0">
+            <a:schemeClr val="accent1"/>
+          </a:fillRef>
+          <a:effectRef idx="0">
+            <a:schemeClr val="accent1"/>
+          </a:effectRef>
+          <a:fontRef idx="minor">
+            <a:schemeClr val="tx1"/>
+          </a:fontRef>
+        </p:style>
+      </p:cxnSp>
+      <p:cxnSp>
+        <p:nvCxnSpPr>
+          <p:cNvPr id="48" name="Elbow Connector 47">
+            <a:extLst>
+              <a:ext uri="{FF2B5EF4-FFF2-40B4-BE49-F238E27FC236}">
+                <a16:creationId xmlns:a16="http://schemas.microsoft.com/office/drawing/2014/main" id="{F77FC94C-9F70-DB17-D12F-D632A14E1ADE}"/>
+              </a:ext>
+            </a:extLst>
+          </p:cNvPr>
+          <p:cNvCxnSpPr>
+            <a:cxnSpLocks/>
+          </p:cNvCxnSpPr>
+          <p:nvPr/>
+        </p:nvCxnSpPr>
+        <p:spPr>
+          <a:xfrm flipV="1">
+            <a:off x="9599070" y="3697873"/>
+            <a:ext cx="7654848" cy="2550587"/>
+          </a:xfrm>
+          <a:prstGeom prst="bentConnector4">
+            <a:avLst>
+              <a:gd name="adj1" fmla="val -11111"/>
+              <a:gd name="adj2" fmla="val 161224"/>
+            </a:avLst>
+          </a:prstGeom>
+          <a:ln w="47879">
+            <a:solidFill>
+              <a:schemeClr val="accent1">
+                <a:lumMod val="75000"/>
+              </a:schemeClr>
+            </a:solidFill>
+            <a:tailEnd type="triangle"/>
+          </a:ln>
+        </p:spPr>
+        <p:style>
+          <a:lnRef idx="1">
+            <a:schemeClr val="accent1"/>
+          </a:lnRef>
+          <a:fillRef idx="0">
+            <a:schemeClr val="accent1"/>
+          </a:fillRef>
+          <a:effectRef idx="0">
+            <a:schemeClr val="accent1"/>
+          </a:effectRef>
+          <a:fontRef idx="minor">
+            <a:schemeClr val="tx1"/>
+          </a:fontRef>
+        </p:style>
+      </p:cxnSp>
+      <p:cxnSp>
+        <p:nvCxnSpPr>
+          <p:cNvPr id="54" name="Straight Arrow Connector 53">
+            <a:extLst>
+              <a:ext uri="{FF2B5EF4-FFF2-40B4-BE49-F238E27FC236}">
+                <a16:creationId xmlns:a16="http://schemas.microsoft.com/office/drawing/2014/main" id="{AFB8FF8B-2747-C86E-3AFB-4991610E4F82}"/>
+              </a:ext>
+            </a:extLst>
+          </p:cNvPr>
+          <p:cNvCxnSpPr>
+            <a:stCxn id="18" idx="0"/>
+            <a:endCxn id="19" idx="2"/>
+          </p:cNvCxnSpPr>
+          <p:nvPr/>
+        </p:nvCxnSpPr>
+        <p:spPr>
+          <a:xfrm flipV="1">
+            <a:off x="17514216" y="4575096"/>
+            <a:ext cx="0" cy="1224075"/>
+          </a:xfrm>
+          <a:prstGeom prst="straightConnector1">
+            <a:avLst/>
+          </a:prstGeom>
+          <a:ln w="75184">
+            <a:solidFill>
+              <a:srgbClr val="C00000"/>
+            </a:solidFill>
+            <a:headEnd type="oval"/>
+            <a:tailEnd type="triangle"/>
+          </a:ln>
+        </p:spPr>
+        <p:style>
+          <a:lnRef idx="1">
+            <a:schemeClr val="accent1"/>
+          </a:lnRef>
+          <a:fillRef idx="0">
+            <a:schemeClr val="accent1"/>
+          </a:fillRef>
+          <a:effectRef idx="0">
+            <a:schemeClr val="accent1"/>
+          </a:effectRef>
+          <a:fontRef idx="minor">
+            <a:schemeClr val="tx1"/>
+          </a:fontRef>
+        </p:style>
+      </p:cxnSp>
+      <p:sp>
+        <p:nvSpPr>
+          <p:cNvPr id="111" name="Rectangle 110">
+            <a:extLst>
+              <a:ext uri="{FF2B5EF4-FFF2-40B4-BE49-F238E27FC236}">
+                <a16:creationId xmlns:a16="http://schemas.microsoft.com/office/drawing/2014/main" id="{E3D9EBAF-6A8B-A9BB-B6E8-8BC916C9866A}"/>
+              </a:ext>
+            </a:extLst>
+          </p:cNvPr>
+          <p:cNvSpPr/>
+          <p:nvPr/>
+        </p:nvSpPr>
+        <p:spPr>
+          <a:xfrm>
+            <a:off x="6986016" y="8963540"/>
+            <a:ext cx="14356080" cy="6638544"/>
+          </a:xfrm>
+          <a:prstGeom prst="rect">
+            <a:avLst/>
+          </a:prstGeom>
+          <a:solidFill>
+            <a:schemeClr val="bg1">
+              <a:lumMod val="95000"/>
+            </a:schemeClr>
+          </a:solidFill>
+          <a:ln w="57150">
+            <a:solidFill>
+              <a:schemeClr val="bg1">
+                <a:lumMod val="50000"/>
+              </a:schemeClr>
+            </a:solidFill>
+          </a:ln>
+        </p:spPr>
+        <p:style>
+          <a:lnRef idx="2">
+            <a:schemeClr val="accent1">
+              <a:shade val="15000"/>
+            </a:schemeClr>
+          </a:lnRef>
+          <a:fillRef idx="1">
+            <a:schemeClr val="accent1"/>
+          </a:fillRef>
+          <a:effectRef idx="0">
+            <a:schemeClr val="accent1"/>
+          </a:effectRef>
+          <a:fontRef idx="minor">
+            <a:schemeClr val="lt1"/>
+          </a:fontRef>
+        </p:style>
+        <p:txBody>
+          <a:bodyPr rtlCol="0" anchor="ctr"/>
+          <a:lstStyle/>
+          <a:p>
+            <a:pPr algn="ctr"/>
+            <a:endParaRPr lang="en-US"/>
+          </a:p>
+        </p:txBody>
+      </p:sp>
+      <p:cxnSp>
+        <p:nvCxnSpPr>
+          <p:cNvPr id="112" name="Elbow Connector 111">
+            <a:extLst>
+              <a:ext uri="{FF2B5EF4-FFF2-40B4-BE49-F238E27FC236}">
+                <a16:creationId xmlns:a16="http://schemas.microsoft.com/office/drawing/2014/main" id="{DEE4623F-C31E-966E-2323-AEECEA97C30B}"/>
+              </a:ext>
+            </a:extLst>
+          </p:cNvPr>
+          <p:cNvCxnSpPr>
+            <a:cxnSpLocks/>
+            <a:stCxn id="125" idx="2"/>
+          </p:cNvCxnSpPr>
+          <p:nvPr/>
+        </p:nvCxnSpPr>
+        <p:spPr>
+          <a:xfrm rot="16200000" flipH="1">
+            <a:off x="10556974" y="11689956"/>
+            <a:ext cx="360856" cy="1459354"/>
+          </a:xfrm>
+          <a:prstGeom prst="bentConnector2">
+            <a:avLst/>
+          </a:prstGeom>
+          <a:ln w="65659">
+            <a:solidFill>
+              <a:srgbClr val="C00000"/>
+            </a:solidFill>
+            <a:headEnd type="oval"/>
+            <a:tailEnd type="triangle"/>
+          </a:ln>
+        </p:spPr>
+        <p:style>
+          <a:lnRef idx="1">
+            <a:schemeClr val="accent1"/>
+          </a:lnRef>
+          <a:fillRef idx="0">
+            <a:schemeClr val="accent1"/>
+          </a:fillRef>
+          <a:effectRef idx="0">
+            <a:schemeClr val="accent1"/>
+          </a:effectRef>
+          <a:fontRef idx="minor">
+            <a:schemeClr val="tx1"/>
+          </a:fontRef>
+        </p:style>
+      </p:cxnSp>
+      <p:cxnSp>
+        <p:nvCxnSpPr>
+          <p:cNvPr id="113" name="Elbow Connector 112">
+            <a:extLst>
+              <a:ext uri="{FF2B5EF4-FFF2-40B4-BE49-F238E27FC236}">
+                <a16:creationId xmlns:a16="http://schemas.microsoft.com/office/drawing/2014/main" id="{4E0C31F0-8E06-2E59-10F8-91584FCD2023}"/>
+              </a:ext>
+            </a:extLst>
+          </p:cNvPr>
+          <p:cNvCxnSpPr>
+            <a:cxnSpLocks/>
+          </p:cNvCxnSpPr>
+          <p:nvPr/>
+        </p:nvCxnSpPr>
+        <p:spPr>
+          <a:xfrm rot="5400000" flipH="1" flipV="1">
+            <a:off x="10510982" y="12505396"/>
+            <a:ext cx="452840" cy="1459354"/>
+          </a:xfrm>
+          <a:prstGeom prst="bentConnector2">
+            <a:avLst/>
+          </a:prstGeom>
+          <a:ln w="27559">
+            <a:solidFill>
+              <a:srgbClr val="C00000"/>
+            </a:solidFill>
+            <a:headEnd type="oval"/>
+            <a:tailEnd type="triangle"/>
+          </a:ln>
+        </p:spPr>
+        <p:style>
+          <a:lnRef idx="1">
+            <a:schemeClr val="accent1"/>
+          </a:lnRef>
+          <a:fillRef idx="0">
+            <a:schemeClr val="accent1"/>
+          </a:fillRef>
+          <a:effectRef idx="0">
+            <a:schemeClr val="accent1"/>
+          </a:effectRef>
+          <a:fontRef idx="minor">
+            <a:schemeClr val="tx1"/>
+          </a:fontRef>
+        </p:style>
+      </p:cxnSp>
+      <p:cxnSp>
+        <p:nvCxnSpPr>
+          <p:cNvPr id="114" name="Straight Arrow Connector 113">
+            <a:extLst>
+              <a:ext uri="{FF2B5EF4-FFF2-40B4-BE49-F238E27FC236}">
+                <a16:creationId xmlns:a16="http://schemas.microsoft.com/office/drawing/2014/main" id="{B4C67339-061A-1A9E-55E6-162B7BAC5A25}"/>
+              </a:ext>
+            </a:extLst>
+          </p:cNvPr>
+          <p:cNvCxnSpPr>
+            <a:cxnSpLocks/>
+          </p:cNvCxnSpPr>
+          <p:nvPr/>
+        </p:nvCxnSpPr>
+        <p:spPr>
+          <a:xfrm>
+            <a:off x="13286478" y="12829708"/>
+            <a:ext cx="892510" cy="0"/>
+          </a:xfrm>
+          <a:prstGeom prst="straightConnector1">
+            <a:avLst/>
+          </a:prstGeom>
+          <a:ln w="117094">
+            <a:solidFill>
+              <a:schemeClr val="accent1">
+                <a:lumMod val="75000"/>
+              </a:schemeClr>
+            </a:solidFill>
+            <a:tailEnd type="triangle"/>
+          </a:ln>
+        </p:spPr>
+        <p:style>
+          <a:lnRef idx="1">
+            <a:schemeClr val="accent1"/>
+          </a:lnRef>
+          <a:fillRef idx="0">
+            <a:schemeClr val="accent1"/>
+          </a:fillRef>
+          <a:effectRef idx="0">
+            <a:schemeClr val="accent1"/>
+          </a:effectRef>
+          <a:fontRef idx="minor">
+            <a:schemeClr val="tx1"/>
+          </a:fontRef>
+        </p:style>
+      </p:cxnSp>
+      <p:cxnSp>
+        <p:nvCxnSpPr>
+          <p:cNvPr id="117" name="Elbow Connector 116">
+            <a:extLst>
+              <a:ext uri="{FF2B5EF4-FFF2-40B4-BE49-F238E27FC236}">
+                <a16:creationId xmlns:a16="http://schemas.microsoft.com/office/drawing/2014/main" id="{7E05DC9B-9601-ADD2-D3AE-1101A3133BD3}"/>
+              </a:ext>
+            </a:extLst>
+          </p:cNvPr>
+          <p:cNvCxnSpPr>
+            <a:cxnSpLocks/>
+            <a:stCxn id="122" idx="0"/>
+            <a:endCxn id="120" idx="0"/>
+          </p:cNvCxnSpPr>
+          <p:nvPr/>
+        </p:nvCxnSpPr>
+        <p:spPr>
+          <a:xfrm rot="16200000" flipH="1">
+            <a:off x="18122024" y="10755156"/>
+            <a:ext cx="1061295" cy="2276912"/>
+          </a:xfrm>
+          <a:prstGeom prst="bentConnector3">
+            <a:avLst>
+              <a:gd name="adj1" fmla="val -21540"/>
+            </a:avLst>
+          </a:prstGeom>
+          <a:ln w="161290">
+            <a:solidFill>
+              <a:schemeClr val="accent1">
+                <a:lumMod val="75000"/>
+              </a:schemeClr>
+            </a:solidFill>
+            <a:tailEnd type="triangle"/>
+          </a:ln>
+        </p:spPr>
+        <p:style>
+          <a:lnRef idx="1">
+            <a:schemeClr val="accent1"/>
+          </a:lnRef>
+          <a:fillRef idx="0">
+            <a:schemeClr val="accent1"/>
+          </a:fillRef>
+          <a:effectRef idx="0">
+            <a:schemeClr val="accent1"/>
+          </a:effectRef>
+          <a:fontRef idx="minor">
+            <a:schemeClr val="tx1"/>
+          </a:fontRef>
+        </p:style>
+      </p:cxnSp>
+      <p:cxnSp>
+        <p:nvCxnSpPr>
+          <p:cNvPr id="118" name="Elbow Connector 117">
+            <a:extLst>
+              <a:ext uri="{FF2B5EF4-FFF2-40B4-BE49-F238E27FC236}">
+                <a16:creationId xmlns:a16="http://schemas.microsoft.com/office/drawing/2014/main" id="{482808FF-81DA-3C92-A794-5AAF183E3C32}"/>
+              </a:ext>
+            </a:extLst>
+          </p:cNvPr>
+          <p:cNvCxnSpPr>
+            <a:cxnSpLocks/>
+            <a:stCxn id="121" idx="2"/>
+            <a:endCxn id="120" idx="2"/>
+          </p:cNvCxnSpPr>
+          <p:nvPr/>
+        </p:nvCxnSpPr>
+        <p:spPr>
+          <a:xfrm rot="5400000" flipH="1" flipV="1">
+            <a:off x="18132670" y="12683029"/>
+            <a:ext cx="1040003" cy="2276912"/>
+          </a:xfrm>
+          <a:prstGeom prst="bentConnector3">
+            <a:avLst>
+              <a:gd name="adj1" fmla="val -21981"/>
+            </a:avLst>
+          </a:prstGeom>
+          <a:ln w="165989">
+            <a:solidFill>
+              <a:schemeClr val="accent1">
+                <a:lumMod val="75000"/>
+              </a:schemeClr>
+            </a:solidFill>
+            <a:tailEnd type="triangle"/>
+          </a:ln>
+        </p:spPr>
+        <p:style>
+          <a:lnRef idx="1">
+            <a:schemeClr val="accent1"/>
+          </a:lnRef>
+          <a:fillRef idx="0">
+            <a:schemeClr val="accent1"/>
+          </a:fillRef>
+          <a:effectRef idx="0">
+            <a:schemeClr val="accent1"/>
+          </a:effectRef>
+          <a:fontRef idx="minor">
+            <a:schemeClr val="tx1"/>
+          </a:fontRef>
+        </p:style>
+      </p:cxnSp>
+      <p:sp>
+        <p:nvSpPr>
+          <p:cNvPr id="119" name="Rectangle 118">
+            <a:extLst>
+              <a:ext uri="{FF2B5EF4-FFF2-40B4-BE49-F238E27FC236}">
+                <a16:creationId xmlns:a16="http://schemas.microsoft.com/office/drawing/2014/main" id="{90CEB0EF-1CF0-A1B8-ECA3-0CE52692D21B}"/>
+              </a:ext>
+            </a:extLst>
+          </p:cNvPr>
+          <p:cNvSpPr/>
+          <p:nvPr/>
+        </p:nvSpPr>
+        <p:spPr>
+          <a:xfrm>
+            <a:off x="11467080" y="12401775"/>
+            <a:ext cx="1819398" cy="877223"/>
+          </a:xfrm>
+          <a:prstGeom prst="rect">
+            <a:avLst/>
+          </a:prstGeom>
+          <a:solidFill>
+            <a:schemeClr val="bg1"/>
+          </a:solidFill>
+          <a:ln w="38100">
+            <a:solidFill>
+              <a:schemeClr val="tx1"/>
+            </a:solidFill>
+          </a:ln>
+        </p:spPr>
+        <p:style>
+          <a:lnRef idx="2">
+            <a:schemeClr val="accent1">
+              <a:shade val="50000"/>
+            </a:schemeClr>
+          </a:lnRef>
+          <a:fillRef idx="1">
+            <a:schemeClr val="accent1"/>
+          </a:fillRef>
+          <a:effectRef idx="0">
+            <a:schemeClr val="accent1"/>
+          </a:effectRef>
+          <a:fontRef idx="minor">
+            <a:schemeClr val="lt1"/>
+          </a:fontRef>
+        </p:style>
+        <p:txBody>
+          <a:bodyPr rtlCol="0" anchor="ctr"/>
+          <a:lstStyle/>
+          <a:p>
+            <a:pPr algn="ctr"/>
+            <a:r>
+              <a:rPr lang="el-GR" sz="2400" b="1" i="1" dirty="0">
+                <a:solidFill>
+                  <a:schemeClr val="tx1"/>
+                </a:solidFill>
+                <a:latin typeface="Arial" panose="020B0604020202020204" pitchFamily="34" charset="0"/>
+                <a:cs typeface="Arial" panose="020B0604020202020204" pitchFamily="34" charset="0"/>
+              </a:rPr>
+              <a:t>β</a:t>
+            </a:r>
+            <a:endParaRPr lang="en-US" sz="2400" b="1" i="1" dirty="0">
+              <a:solidFill>
+                <a:schemeClr val="tx1"/>
+              </a:solidFill>
+              <a:latin typeface="Arial" panose="020B0604020202020204" pitchFamily="34" charset="0"/>
+              <a:cs typeface="Arial" panose="020B0604020202020204" pitchFamily="34" charset="0"/>
+            </a:endParaRPr>
+          </a:p>
+        </p:txBody>
+      </p:sp>
+      <p:sp>
+        <p:nvSpPr>
+          <p:cNvPr id="120" name="Rectangle 119">
+            <a:extLst>
+              <a:ext uri="{FF2B5EF4-FFF2-40B4-BE49-F238E27FC236}">
+                <a16:creationId xmlns:a16="http://schemas.microsoft.com/office/drawing/2014/main" id="{B4BB9942-ABBD-88AE-F28C-41FCC163D07B}"/>
+              </a:ext>
+            </a:extLst>
+          </p:cNvPr>
+          <p:cNvSpPr/>
+          <p:nvPr/>
+        </p:nvSpPr>
+        <p:spPr>
+          <a:xfrm>
+            <a:off x="18881429" y="12424260"/>
+            <a:ext cx="1819398" cy="877223"/>
+          </a:xfrm>
+          <a:prstGeom prst="rect">
+            <a:avLst/>
+          </a:prstGeom>
+          <a:solidFill>
+            <a:schemeClr val="bg1"/>
+          </a:solidFill>
+          <a:ln w="38100">
+            <a:solidFill>
+              <a:schemeClr val="tx1"/>
+            </a:solidFill>
+          </a:ln>
+        </p:spPr>
+        <p:style>
+          <a:lnRef idx="2">
+            <a:schemeClr val="accent1">
+              <a:shade val="50000"/>
+            </a:schemeClr>
+          </a:lnRef>
+          <a:fillRef idx="1">
+            <a:schemeClr val="accent1"/>
+          </a:fillRef>
+          <a:effectRef idx="0">
+            <a:schemeClr val="accent1"/>
+          </a:effectRef>
+          <a:fontRef idx="minor">
+            <a:schemeClr val="lt1"/>
+          </a:fontRef>
+        </p:style>
+        <p:txBody>
+          <a:bodyPr rtlCol="0" anchor="ctr"/>
+          <a:lstStyle/>
+          <a:p>
+            <a:pPr algn="ctr"/>
+            <a:r>
+              <a:rPr lang="el-GR" sz="2400" b="1" i="1" dirty="0">
+                <a:solidFill>
+                  <a:schemeClr val="tx1"/>
+                </a:solidFill>
+                <a:latin typeface="Arial" panose="020B0604020202020204" pitchFamily="34" charset="0"/>
+                <a:cs typeface="Arial" panose="020B0604020202020204" pitchFamily="34" charset="0"/>
+              </a:rPr>
+              <a:t>Ν</a:t>
+            </a:r>
+            <a:r>
+              <a:rPr lang="en-US" sz="2400" b="1" baseline="-25000" dirty="0">
+                <a:solidFill>
+                  <a:schemeClr val="tx1"/>
+                </a:solidFill>
+                <a:latin typeface="Arial" panose="020B0604020202020204" pitchFamily="34" charset="0"/>
+                <a:cs typeface="Arial" panose="020B0604020202020204" pitchFamily="34" charset="0"/>
+              </a:rPr>
+              <a:t>area</a:t>
+            </a:r>
+            <a:endParaRPr lang="en-US" sz="2400" b="1" i="1" dirty="0">
+              <a:solidFill>
+                <a:schemeClr val="tx1"/>
+              </a:solidFill>
+              <a:latin typeface="Arial" panose="020B0604020202020204" pitchFamily="34" charset="0"/>
+              <a:cs typeface="Arial" panose="020B0604020202020204" pitchFamily="34" charset="0"/>
+            </a:endParaRPr>
+          </a:p>
+        </p:txBody>
+      </p:sp>
+      <p:sp>
+        <p:nvSpPr>
+          <p:cNvPr id="124" name="Rectangle 123">
+            <a:extLst>
+              <a:ext uri="{FF2B5EF4-FFF2-40B4-BE49-F238E27FC236}">
+                <a16:creationId xmlns:a16="http://schemas.microsoft.com/office/drawing/2014/main" id="{8A33E0A4-2826-A70A-7BC3-4043AEDFCBA2}"/>
+              </a:ext>
+            </a:extLst>
+          </p:cNvPr>
+          <p:cNvSpPr/>
+          <p:nvPr/>
+        </p:nvSpPr>
+        <p:spPr>
+          <a:xfrm>
+            <a:off x="14189827" y="12391097"/>
+            <a:ext cx="1819398" cy="877223"/>
+          </a:xfrm>
+          <a:prstGeom prst="rect">
+            <a:avLst/>
+          </a:prstGeom>
+          <a:solidFill>
+            <a:schemeClr val="bg1"/>
+          </a:solidFill>
+          <a:ln w="38100">
+            <a:solidFill>
+              <a:schemeClr val="tx1"/>
+            </a:solidFill>
+          </a:ln>
+        </p:spPr>
+        <p:style>
+          <a:lnRef idx="2">
+            <a:schemeClr val="accent1">
+              <a:shade val="50000"/>
+            </a:schemeClr>
+          </a:lnRef>
+          <a:fillRef idx="1">
+            <a:schemeClr val="accent1"/>
+          </a:fillRef>
+          <a:effectRef idx="0">
+            <a:schemeClr val="accent1"/>
+          </a:effectRef>
+          <a:fontRef idx="minor">
+            <a:schemeClr val="lt1"/>
+          </a:fontRef>
+        </p:style>
+        <p:txBody>
+          <a:bodyPr rtlCol="0" anchor="ctr"/>
+          <a:lstStyle/>
+          <a:p>
+            <a:pPr algn="ctr"/>
+            <a:r>
+              <a:rPr lang="en-US" sz="2400" b="1" i="1" dirty="0">
+                <a:solidFill>
+                  <a:schemeClr val="tx1"/>
+                </a:solidFill>
+                <a:latin typeface="Arial" panose="020B0604020202020204" pitchFamily="34" charset="0"/>
+                <a:cs typeface="Arial" panose="020B0604020202020204" pitchFamily="34" charset="0"/>
+              </a:rPr>
+              <a:t>C</a:t>
+            </a:r>
+            <a:r>
+              <a:rPr lang="en-US" sz="2400" b="1" baseline="-25000" dirty="0">
+                <a:solidFill>
+                  <a:schemeClr val="tx1"/>
+                </a:solidFill>
+                <a:latin typeface="Arial" panose="020B0604020202020204" pitchFamily="34" charset="0"/>
+                <a:cs typeface="Arial" panose="020B0604020202020204" pitchFamily="34" charset="0"/>
+              </a:rPr>
+              <a:t>i</a:t>
+            </a:r>
+            <a:r>
+              <a:rPr lang="en-US" sz="2400" b="1" i="1" dirty="0">
+                <a:solidFill>
+                  <a:schemeClr val="tx1"/>
+                </a:solidFill>
+                <a:latin typeface="Arial" panose="020B0604020202020204" pitchFamily="34" charset="0"/>
+                <a:cs typeface="Arial" panose="020B0604020202020204" pitchFamily="34" charset="0"/>
+              </a:rPr>
+              <a:t>:C</a:t>
+            </a:r>
+            <a:r>
+              <a:rPr lang="en-US" sz="2400" b="1" baseline="-25000" dirty="0">
+                <a:solidFill>
+                  <a:schemeClr val="tx1"/>
+                </a:solidFill>
+                <a:latin typeface="Arial" panose="020B0604020202020204" pitchFamily="34" charset="0"/>
+                <a:cs typeface="Arial" panose="020B0604020202020204" pitchFamily="34" charset="0"/>
+              </a:rPr>
+              <a:t>a</a:t>
+            </a:r>
+          </a:p>
+        </p:txBody>
+      </p:sp>
+      <p:cxnSp>
+        <p:nvCxnSpPr>
+          <p:cNvPr id="129" name="Straight Arrow Connector 128">
+            <a:extLst>
+              <a:ext uri="{FF2B5EF4-FFF2-40B4-BE49-F238E27FC236}">
+                <a16:creationId xmlns:a16="http://schemas.microsoft.com/office/drawing/2014/main" id="{B7546C00-72A5-572D-149F-802C7FB0A7BD}"/>
+              </a:ext>
+            </a:extLst>
+          </p:cNvPr>
+          <p:cNvCxnSpPr>
+            <a:cxnSpLocks/>
+          </p:cNvCxnSpPr>
+          <p:nvPr/>
+        </p:nvCxnSpPr>
+        <p:spPr>
+          <a:xfrm flipV="1">
+            <a:off x="11013433" y="14176525"/>
+            <a:ext cx="5591084" cy="10678"/>
+          </a:xfrm>
+          <a:prstGeom prst="straightConnector1">
+            <a:avLst/>
+          </a:prstGeom>
+          <a:ln w="6350">
+            <a:solidFill>
+              <a:schemeClr val="tx1"/>
+            </a:solidFill>
+            <a:prstDash val="lgDash"/>
+            <a:headEnd type="oval"/>
+            <a:tailEnd type="triangle"/>
+          </a:ln>
+        </p:spPr>
+        <p:style>
+          <a:lnRef idx="1">
+            <a:schemeClr val="accent1"/>
+          </a:lnRef>
+          <a:fillRef idx="0">
+            <a:schemeClr val="accent1"/>
+          </a:fillRef>
+          <a:effectRef idx="0">
+            <a:schemeClr val="accent1"/>
+          </a:effectRef>
+          <a:fontRef idx="minor">
+            <a:schemeClr val="tx1"/>
+          </a:fontRef>
+        </p:style>
+      </p:cxnSp>
+      <p:cxnSp>
+        <p:nvCxnSpPr>
+          <p:cNvPr id="130" name="Elbow Connector 129">
+            <a:extLst>
+              <a:ext uri="{FF2B5EF4-FFF2-40B4-BE49-F238E27FC236}">
+                <a16:creationId xmlns:a16="http://schemas.microsoft.com/office/drawing/2014/main" id="{12F07468-58B0-ADC4-13D2-7BB9C0077960}"/>
+              </a:ext>
+            </a:extLst>
+          </p:cNvPr>
+          <p:cNvCxnSpPr>
+            <a:cxnSpLocks/>
+          </p:cNvCxnSpPr>
+          <p:nvPr/>
+        </p:nvCxnSpPr>
+        <p:spPr>
+          <a:xfrm flipV="1">
+            <a:off x="9599070" y="11362965"/>
+            <a:ext cx="7654848" cy="2550587"/>
+          </a:xfrm>
+          <a:prstGeom prst="bentConnector4">
+            <a:avLst>
+              <a:gd name="adj1" fmla="val -15756"/>
+              <a:gd name="adj2" fmla="val 160739"/>
+            </a:avLst>
+          </a:prstGeom>
+          <a:ln w="59055">
+            <a:solidFill>
+              <a:schemeClr val="accent1">
+                <a:lumMod val="75000"/>
+              </a:schemeClr>
+            </a:solidFill>
+            <a:tailEnd type="triangle"/>
+          </a:ln>
+        </p:spPr>
+        <p:style>
+          <a:lnRef idx="1">
+            <a:schemeClr val="accent1"/>
+          </a:lnRef>
+          <a:fillRef idx="0">
+            <a:schemeClr val="accent1"/>
+          </a:fillRef>
+          <a:effectRef idx="0">
+            <a:schemeClr val="accent1"/>
+          </a:effectRef>
+          <a:fontRef idx="minor">
+            <a:schemeClr val="tx1"/>
+          </a:fontRef>
+        </p:style>
+      </p:cxnSp>
+      <p:cxnSp>
+        <p:nvCxnSpPr>
+          <p:cNvPr id="131" name="Straight Arrow Connector 130">
+            <a:extLst>
+              <a:ext uri="{FF2B5EF4-FFF2-40B4-BE49-F238E27FC236}">
+                <a16:creationId xmlns:a16="http://schemas.microsoft.com/office/drawing/2014/main" id="{79D495FF-3FF9-0090-727A-09C6D3D03A07}"/>
+              </a:ext>
+            </a:extLst>
+          </p:cNvPr>
+          <p:cNvCxnSpPr>
+            <a:stCxn id="121" idx="0"/>
+            <a:endCxn id="122" idx="2"/>
+          </p:cNvCxnSpPr>
+          <p:nvPr/>
+        </p:nvCxnSpPr>
+        <p:spPr>
+          <a:xfrm flipV="1">
+            <a:off x="17514216" y="12240188"/>
+            <a:ext cx="0" cy="1224075"/>
+          </a:xfrm>
+          <a:prstGeom prst="straightConnector1">
+            <a:avLst/>
+          </a:prstGeom>
+          <a:ln w="92456">
+            <a:solidFill>
+              <a:srgbClr val="C00000"/>
+            </a:solidFill>
+            <a:headEnd type="oval"/>
+            <a:tailEnd type="triangle"/>
+          </a:ln>
+        </p:spPr>
+        <p:style>
+          <a:lnRef idx="1">
+            <a:schemeClr val="accent1"/>
+          </a:lnRef>
+          <a:fillRef idx="0">
+            <a:schemeClr val="accent1"/>
+          </a:fillRef>
+          <a:effectRef idx="0">
+            <a:schemeClr val="accent1"/>
+          </a:effectRef>
+          <a:fontRef idx="minor">
+            <a:schemeClr val="tx1"/>
+          </a:fontRef>
+        </p:style>
+      </p:cxnSp>
+      <p:sp>
+        <p:nvSpPr>
+          <p:cNvPr id="137" name="Rectangle 136">
+            <a:extLst>
+              <a:ext uri="{FF2B5EF4-FFF2-40B4-BE49-F238E27FC236}">
+                <a16:creationId xmlns:a16="http://schemas.microsoft.com/office/drawing/2014/main" id="{EFD512D2-8D9B-FEF4-35C0-1A743950094B}"/>
+              </a:ext>
+            </a:extLst>
+          </p:cNvPr>
+          <p:cNvSpPr/>
+          <p:nvPr/>
+        </p:nvSpPr>
+        <p:spPr>
+          <a:xfrm>
+            <a:off x="7239918" y="793025"/>
+            <a:ext cx="2359152" cy="1005840"/>
+          </a:xfrm>
+          <a:prstGeom prst="rect">
+            <a:avLst/>
+          </a:prstGeom>
+          <a:solidFill>
+            <a:schemeClr val="bg1"/>
+          </a:solidFill>
+          <a:ln w="57150">
+            <a:solidFill>
+              <a:schemeClr val="tx1"/>
+            </a:solidFill>
+          </a:ln>
+        </p:spPr>
+        <p:style>
+          <a:lnRef idx="2">
+            <a:schemeClr val="accent1">
+              <a:shade val="15000"/>
+            </a:schemeClr>
+          </a:lnRef>
+          <a:fillRef idx="1">
+            <a:schemeClr val="accent1"/>
+          </a:fillRef>
+          <a:effectRef idx="0">
+            <a:schemeClr val="accent1"/>
+          </a:effectRef>
+          <a:fontRef idx="minor">
+            <a:schemeClr val="lt1"/>
+          </a:fontRef>
+        </p:style>
+        <p:txBody>
+          <a:bodyPr rtlCol="0" anchor="ctr"/>
+          <a:lstStyle/>
+          <a:p>
+            <a:pPr algn="ctr"/>
+            <a:r>
+              <a:rPr lang="en-US" sz="2800" b="1" dirty="0">
+                <a:solidFill>
+                  <a:schemeClr val="tx1"/>
+                </a:solidFill>
+                <a:latin typeface="Arial" panose="020B0604020202020204" pitchFamily="34" charset="0"/>
+                <a:cs typeface="Arial" panose="020B0604020202020204" pitchFamily="34" charset="0"/>
+              </a:rPr>
+              <a:t>C</a:t>
+            </a:r>
+            <a:r>
+              <a:rPr lang="en-US" sz="2800" b="1" baseline="-25000" dirty="0">
+                <a:solidFill>
+                  <a:schemeClr val="tx1"/>
+                </a:solidFill>
+                <a:latin typeface="Arial" panose="020B0604020202020204" pitchFamily="34" charset="0"/>
+                <a:cs typeface="Arial" panose="020B0604020202020204" pitchFamily="34" charset="0"/>
+              </a:rPr>
+              <a:t>3</a:t>
+            </a:r>
+            <a:r>
+              <a:rPr lang="en-US" sz="2800" b="1" dirty="0">
+                <a:solidFill>
+                  <a:schemeClr val="tx1"/>
+                </a:solidFill>
+                <a:latin typeface="Arial" panose="020B0604020202020204" pitchFamily="34" charset="0"/>
+                <a:cs typeface="Arial" panose="020B0604020202020204" pitchFamily="34" charset="0"/>
+              </a:rPr>
+              <a:t> species</a:t>
+            </a:r>
+          </a:p>
+        </p:txBody>
+      </p:sp>
+      <p:sp>
+        <p:nvSpPr>
+          <p:cNvPr id="138" name="Rectangle 137">
+            <a:extLst>
+              <a:ext uri="{FF2B5EF4-FFF2-40B4-BE49-F238E27FC236}">
+                <a16:creationId xmlns:a16="http://schemas.microsoft.com/office/drawing/2014/main" id="{BB1376FD-FDEF-5420-00D8-A10C8F62294F}"/>
+              </a:ext>
+            </a:extLst>
+          </p:cNvPr>
+          <p:cNvSpPr/>
+          <p:nvPr/>
+        </p:nvSpPr>
+        <p:spPr>
+          <a:xfrm>
+            <a:off x="7239918" y="8460620"/>
+            <a:ext cx="2359152" cy="1005840"/>
+          </a:xfrm>
+          <a:prstGeom prst="rect">
+            <a:avLst/>
+          </a:prstGeom>
+          <a:solidFill>
+            <a:schemeClr val="bg1"/>
+          </a:solidFill>
+          <a:ln w="57150">
+            <a:solidFill>
+              <a:schemeClr val="tx1"/>
+            </a:solidFill>
+          </a:ln>
+        </p:spPr>
+        <p:style>
+          <a:lnRef idx="2">
+            <a:schemeClr val="accent1">
+              <a:shade val="15000"/>
+            </a:schemeClr>
+          </a:lnRef>
+          <a:fillRef idx="1">
+            <a:schemeClr val="accent1"/>
+          </a:fillRef>
+          <a:effectRef idx="0">
+            <a:schemeClr val="accent1"/>
+          </a:effectRef>
+          <a:fontRef idx="minor">
+            <a:schemeClr val="lt1"/>
+          </a:fontRef>
+        </p:style>
+        <p:txBody>
+          <a:bodyPr rtlCol="0" anchor="ctr"/>
+          <a:lstStyle/>
+          <a:p>
+            <a:pPr algn="ctr"/>
+            <a:r>
+              <a:rPr lang="en-US" sz="2800" b="1" dirty="0">
+                <a:solidFill>
+                  <a:schemeClr val="tx1"/>
+                </a:solidFill>
+                <a:latin typeface="Arial" panose="020B0604020202020204" pitchFamily="34" charset="0"/>
+                <a:cs typeface="Arial" panose="020B0604020202020204" pitchFamily="34" charset="0"/>
+              </a:rPr>
+              <a:t>C</a:t>
+            </a:r>
+            <a:r>
+              <a:rPr lang="en-US" sz="2800" b="1" baseline="-25000" dirty="0">
+                <a:solidFill>
+                  <a:schemeClr val="tx1"/>
+                </a:solidFill>
+                <a:latin typeface="Arial" panose="020B0604020202020204" pitchFamily="34" charset="0"/>
+                <a:cs typeface="Arial" panose="020B0604020202020204" pitchFamily="34" charset="0"/>
+              </a:rPr>
+              <a:t>4</a:t>
+            </a:r>
+            <a:r>
+              <a:rPr lang="en-US" sz="2800" b="1" dirty="0">
+                <a:solidFill>
+                  <a:schemeClr val="tx1"/>
+                </a:solidFill>
+                <a:latin typeface="Arial" panose="020B0604020202020204" pitchFamily="34" charset="0"/>
+                <a:cs typeface="Arial" panose="020B0604020202020204" pitchFamily="34" charset="0"/>
+              </a:rPr>
+              <a:t> species</a:t>
+            </a:r>
+          </a:p>
+        </p:txBody>
+      </p:sp>
+      <p:sp>
+        <p:nvSpPr>
+          <p:cNvPr id="18" name="Rectangle 17">
+            <a:extLst>
+              <a:ext uri="{FF2B5EF4-FFF2-40B4-BE49-F238E27FC236}">
+                <a16:creationId xmlns:a16="http://schemas.microsoft.com/office/drawing/2014/main" id="{3DC9C826-34F4-86B7-32AA-06FC02007627}"/>
+              </a:ext>
+            </a:extLst>
+          </p:cNvPr>
+          <p:cNvSpPr/>
+          <p:nvPr/>
+        </p:nvSpPr>
+        <p:spPr>
+          <a:xfrm>
+            <a:off x="16604517" y="5799171"/>
+            <a:ext cx="1819398" cy="877223"/>
+          </a:xfrm>
+          <a:prstGeom prst="rect">
+            <a:avLst/>
+          </a:prstGeom>
+          <a:solidFill>
+            <a:schemeClr val="bg1"/>
+          </a:solidFill>
+          <a:ln w="38100">
+            <a:solidFill>
+              <a:schemeClr val="tx1"/>
+            </a:solidFill>
+          </a:ln>
+        </p:spPr>
+        <p:style>
+          <a:lnRef idx="2">
+            <a:schemeClr val="accent1">
+              <a:shade val="50000"/>
+            </a:schemeClr>
+          </a:lnRef>
+          <a:fillRef idx="1">
+            <a:schemeClr val="accent1"/>
+          </a:fillRef>
+          <a:effectRef idx="0">
+            <a:schemeClr val="accent1"/>
+          </a:effectRef>
+          <a:fontRef idx="minor">
+            <a:schemeClr val="lt1"/>
+          </a:fontRef>
+        </p:style>
+        <p:txBody>
+          <a:bodyPr rtlCol="0" anchor="ctr"/>
+          <a:lstStyle/>
+          <a:p>
+            <a:pPr algn="ctr"/>
+            <a:r>
+              <a:rPr lang="en-US" sz="2400" b="1" i="1" dirty="0">
+                <a:solidFill>
+                  <a:schemeClr val="tx1"/>
+                </a:solidFill>
+                <a:latin typeface="Arial" panose="020B0604020202020204" pitchFamily="34" charset="0"/>
+                <a:cs typeface="Arial" panose="020B0604020202020204" pitchFamily="34" charset="0"/>
+              </a:rPr>
+              <a:t>M</a:t>
+            </a:r>
+            <a:r>
+              <a:rPr lang="en-US" sz="2400" b="1" baseline="-25000" dirty="0">
+                <a:solidFill>
+                  <a:schemeClr val="tx1"/>
+                </a:solidFill>
+                <a:latin typeface="Arial" panose="020B0604020202020204" pitchFamily="34" charset="0"/>
+                <a:cs typeface="Arial" panose="020B0604020202020204" pitchFamily="34" charset="0"/>
+              </a:rPr>
+              <a:t>area</a:t>
+            </a:r>
+            <a:endParaRPr lang="en-US" sz="2400" b="1" i="1" dirty="0">
+              <a:solidFill>
+                <a:schemeClr val="tx1"/>
+              </a:solidFill>
+              <a:latin typeface="Arial" panose="020B0604020202020204" pitchFamily="34" charset="0"/>
+              <a:cs typeface="Arial" panose="020B0604020202020204" pitchFamily="34" charset="0"/>
+            </a:endParaRPr>
+          </a:p>
+        </p:txBody>
+      </p:sp>
+      <p:sp>
+        <p:nvSpPr>
+          <p:cNvPr id="121" name="Rectangle 120">
+            <a:extLst>
+              <a:ext uri="{FF2B5EF4-FFF2-40B4-BE49-F238E27FC236}">
+                <a16:creationId xmlns:a16="http://schemas.microsoft.com/office/drawing/2014/main" id="{558000CD-E826-46AF-0824-726CFDBEC003}"/>
+              </a:ext>
+            </a:extLst>
+          </p:cNvPr>
+          <p:cNvSpPr/>
+          <p:nvPr/>
+        </p:nvSpPr>
+        <p:spPr>
+          <a:xfrm>
+            <a:off x="16604517" y="13464263"/>
+            <a:ext cx="1819398" cy="877223"/>
+          </a:xfrm>
+          <a:prstGeom prst="rect">
+            <a:avLst/>
+          </a:prstGeom>
+          <a:solidFill>
+            <a:schemeClr val="bg1"/>
+          </a:solidFill>
+          <a:ln w="38100">
+            <a:solidFill>
+              <a:schemeClr val="tx1"/>
+            </a:solidFill>
+          </a:ln>
+        </p:spPr>
+        <p:style>
+          <a:lnRef idx="2">
+            <a:schemeClr val="accent1">
+              <a:shade val="50000"/>
+            </a:schemeClr>
+          </a:lnRef>
+          <a:fillRef idx="1">
+            <a:schemeClr val="accent1"/>
+          </a:fillRef>
+          <a:effectRef idx="0">
+            <a:schemeClr val="accent1"/>
+          </a:effectRef>
+          <a:fontRef idx="minor">
+            <a:schemeClr val="lt1"/>
+          </a:fontRef>
+        </p:style>
+        <p:txBody>
+          <a:bodyPr rtlCol="0" anchor="ctr"/>
+          <a:lstStyle/>
+          <a:p>
+            <a:pPr algn="ctr"/>
+            <a:r>
+              <a:rPr lang="en-US" sz="2400" b="1" i="1" dirty="0">
+                <a:solidFill>
+                  <a:schemeClr val="tx1"/>
+                </a:solidFill>
+                <a:latin typeface="Arial" panose="020B0604020202020204" pitchFamily="34" charset="0"/>
+                <a:cs typeface="Arial" panose="020B0604020202020204" pitchFamily="34" charset="0"/>
+              </a:rPr>
+              <a:t>M</a:t>
+            </a:r>
+            <a:r>
+              <a:rPr lang="en-US" sz="2400" b="1" baseline="-25000" dirty="0">
+                <a:solidFill>
+                  <a:schemeClr val="tx1"/>
+                </a:solidFill>
+                <a:latin typeface="Arial" panose="020B0604020202020204" pitchFamily="34" charset="0"/>
+                <a:cs typeface="Arial" panose="020B0604020202020204" pitchFamily="34" charset="0"/>
+              </a:rPr>
+              <a:t>area</a:t>
+            </a:r>
+            <a:endParaRPr lang="en-US" sz="2400" b="1" i="1" dirty="0">
+              <a:solidFill>
+                <a:schemeClr val="tx1"/>
+              </a:solidFill>
+              <a:latin typeface="Arial" panose="020B0604020202020204" pitchFamily="34" charset="0"/>
+              <a:cs typeface="Arial" panose="020B0604020202020204" pitchFamily="34" charset="0"/>
+            </a:endParaRPr>
+          </a:p>
+        </p:txBody>
+      </p:sp>
+      <p:cxnSp>
+        <p:nvCxnSpPr>
+          <p:cNvPr id="87" name="Elbow Connector 86">
+            <a:extLst>
+              <a:ext uri="{FF2B5EF4-FFF2-40B4-BE49-F238E27FC236}">
+                <a16:creationId xmlns:a16="http://schemas.microsoft.com/office/drawing/2014/main" id="{E3072726-9638-13B3-D991-18A75A79BD02}"/>
+              </a:ext>
+            </a:extLst>
+          </p:cNvPr>
+          <p:cNvCxnSpPr>
+            <a:cxnSpLocks/>
+          </p:cNvCxnSpPr>
+          <p:nvPr/>
+        </p:nvCxnSpPr>
+        <p:spPr>
+          <a:xfrm flipV="1">
+            <a:off x="11021384" y="5613906"/>
+            <a:ext cx="3420193" cy="444988"/>
+          </a:xfrm>
+          <a:prstGeom prst="bentConnector3">
+            <a:avLst>
+              <a:gd name="adj1" fmla="val 99983"/>
+            </a:avLst>
+          </a:prstGeom>
+          <a:ln w="24765">
+            <a:solidFill>
+              <a:schemeClr val="accent1">
+                <a:lumMod val="75000"/>
+              </a:schemeClr>
+            </a:solidFill>
+            <a:prstDash val="solid"/>
+            <a:headEnd type="none"/>
+            <a:tailEnd type="triangle"/>
+          </a:ln>
+        </p:spPr>
+        <p:style>
+          <a:lnRef idx="1">
+            <a:schemeClr val="accent1"/>
+          </a:lnRef>
+          <a:fillRef idx="0">
+            <a:schemeClr val="accent1"/>
+          </a:fillRef>
+          <a:effectRef idx="0">
+            <a:schemeClr val="accent1"/>
+          </a:effectRef>
+          <a:fontRef idx="minor">
+            <a:schemeClr val="tx1"/>
+          </a:fontRef>
+        </p:style>
+      </p:cxnSp>
+      <p:sp>
+        <p:nvSpPr>
+          <p:cNvPr id="19" name="Rectangle 18">
+            <a:extLst>
+              <a:ext uri="{FF2B5EF4-FFF2-40B4-BE49-F238E27FC236}">
+                <a16:creationId xmlns:a16="http://schemas.microsoft.com/office/drawing/2014/main" id="{BFDCA724-73AD-FA2E-0A0A-16D28EA01D0E}"/>
+              </a:ext>
+            </a:extLst>
+          </p:cNvPr>
+          <p:cNvSpPr/>
+          <p:nvPr/>
+        </p:nvSpPr>
+        <p:spPr>
+          <a:xfrm>
+            <a:off x="16604517" y="3697873"/>
+            <a:ext cx="1819398" cy="877223"/>
+          </a:xfrm>
+          <a:prstGeom prst="rect">
+            <a:avLst/>
+          </a:prstGeom>
+          <a:solidFill>
+            <a:schemeClr val="bg1"/>
+          </a:solidFill>
+          <a:ln w="38100">
+            <a:solidFill>
+              <a:schemeClr val="tx1"/>
+            </a:solidFill>
+          </a:ln>
+        </p:spPr>
+        <p:style>
+          <a:lnRef idx="2">
+            <a:schemeClr val="accent1">
+              <a:shade val="50000"/>
+            </a:schemeClr>
+          </a:lnRef>
+          <a:fillRef idx="1">
+            <a:schemeClr val="accent1"/>
+          </a:fillRef>
+          <a:effectRef idx="0">
+            <a:schemeClr val="accent1"/>
+          </a:effectRef>
+          <a:fontRef idx="minor">
+            <a:schemeClr val="lt1"/>
+          </a:fontRef>
+        </p:style>
+        <p:txBody>
+          <a:bodyPr rtlCol="0" anchor="ctr"/>
+          <a:lstStyle/>
+          <a:p>
+            <a:pPr algn="ctr"/>
+            <a:r>
+              <a:rPr lang="en-US" sz="2400" b="1" i="1" dirty="0">
+                <a:solidFill>
+                  <a:schemeClr val="tx1"/>
+                </a:solidFill>
+                <a:latin typeface="Arial" panose="020B0604020202020204" pitchFamily="34" charset="0"/>
+                <a:cs typeface="Arial" panose="020B0604020202020204" pitchFamily="34" charset="0"/>
+              </a:rPr>
+              <a:t>N</a:t>
+            </a:r>
+            <a:r>
+              <a:rPr lang="en-US" sz="2400" b="1" baseline="-25000" dirty="0">
+                <a:solidFill>
+                  <a:schemeClr val="tx1"/>
+                </a:solidFill>
+                <a:latin typeface="Arial" panose="020B0604020202020204" pitchFamily="34" charset="0"/>
+                <a:cs typeface="Arial" panose="020B0604020202020204" pitchFamily="34" charset="0"/>
+              </a:rPr>
+              <a:t>mass</a:t>
+            </a:r>
+            <a:endParaRPr lang="en-US" sz="2400" b="1" i="1" dirty="0">
+              <a:solidFill>
+                <a:schemeClr val="tx1"/>
+              </a:solidFill>
+              <a:latin typeface="Arial" panose="020B0604020202020204" pitchFamily="34" charset="0"/>
+              <a:cs typeface="Arial" panose="020B0604020202020204" pitchFamily="34" charset="0"/>
+            </a:endParaRPr>
+          </a:p>
+        </p:txBody>
+      </p:sp>
+      <p:sp>
+        <p:nvSpPr>
+          <p:cNvPr id="21" name="Rectangle 20">
+            <a:extLst>
+              <a:ext uri="{FF2B5EF4-FFF2-40B4-BE49-F238E27FC236}">
+                <a16:creationId xmlns:a16="http://schemas.microsoft.com/office/drawing/2014/main" id="{2EEA2BDE-BF11-CC00-EBDB-EB0105847B29}"/>
+              </a:ext>
+            </a:extLst>
+          </p:cNvPr>
+          <p:cNvSpPr/>
+          <p:nvPr/>
+        </p:nvSpPr>
+        <p:spPr>
+          <a:xfrm>
+            <a:off x="14189827" y="4726005"/>
+            <a:ext cx="1819398" cy="877223"/>
+          </a:xfrm>
+          <a:prstGeom prst="rect">
+            <a:avLst/>
+          </a:prstGeom>
+          <a:solidFill>
+            <a:schemeClr val="bg1"/>
+          </a:solidFill>
+          <a:ln w="38100">
+            <a:solidFill>
+              <a:schemeClr val="tx1"/>
+            </a:solidFill>
+          </a:ln>
+        </p:spPr>
+        <p:style>
+          <a:lnRef idx="2">
+            <a:schemeClr val="accent1">
+              <a:shade val="50000"/>
+            </a:schemeClr>
+          </a:lnRef>
+          <a:fillRef idx="1">
+            <a:schemeClr val="accent1"/>
+          </a:fillRef>
+          <a:effectRef idx="0">
+            <a:schemeClr val="accent1"/>
+          </a:effectRef>
+          <a:fontRef idx="minor">
+            <a:schemeClr val="lt1"/>
+          </a:fontRef>
+        </p:style>
+        <p:txBody>
+          <a:bodyPr rtlCol="0" anchor="ctr"/>
+          <a:lstStyle/>
+          <a:p>
+            <a:pPr algn="ctr"/>
+            <a:r>
+              <a:rPr lang="en-US" sz="2400" b="1" i="1" dirty="0">
+                <a:solidFill>
+                  <a:schemeClr val="tx1"/>
+                </a:solidFill>
+                <a:latin typeface="Arial" panose="020B0604020202020204" pitchFamily="34" charset="0"/>
+                <a:cs typeface="Arial" panose="020B0604020202020204" pitchFamily="34" charset="0"/>
+              </a:rPr>
+              <a:t>C</a:t>
+            </a:r>
+            <a:r>
+              <a:rPr lang="en-US" sz="2400" b="1" baseline="-25000" dirty="0">
+                <a:solidFill>
+                  <a:schemeClr val="tx1"/>
+                </a:solidFill>
+                <a:latin typeface="Arial" panose="020B0604020202020204" pitchFamily="34" charset="0"/>
+                <a:cs typeface="Arial" panose="020B0604020202020204" pitchFamily="34" charset="0"/>
+              </a:rPr>
+              <a:t>i</a:t>
+            </a:r>
+            <a:r>
+              <a:rPr lang="en-US" sz="2400" b="1" i="1" dirty="0">
+                <a:solidFill>
+                  <a:schemeClr val="tx1"/>
+                </a:solidFill>
+                <a:latin typeface="Arial" panose="020B0604020202020204" pitchFamily="34" charset="0"/>
+                <a:cs typeface="Arial" panose="020B0604020202020204" pitchFamily="34" charset="0"/>
+              </a:rPr>
+              <a:t>:C</a:t>
+            </a:r>
+            <a:r>
+              <a:rPr lang="en-US" sz="2400" b="1" baseline="-25000" dirty="0">
+                <a:solidFill>
+                  <a:schemeClr val="tx1"/>
+                </a:solidFill>
+                <a:latin typeface="Arial" panose="020B0604020202020204" pitchFamily="34" charset="0"/>
+                <a:cs typeface="Arial" panose="020B0604020202020204" pitchFamily="34" charset="0"/>
+              </a:rPr>
+              <a:t>a</a:t>
+            </a:r>
+          </a:p>
+        </p:txBody>
+      </p:sp>
+      <p:sp>
+        <p:nvSpPr>
+          <p:cNvPr id="122" name="Rectangle 121">
+            <a:extLst>
+              <a:ext uri="{FF2B5EF4-FFF2-40B4-BE49-F238E27FC236}">
+                <a16:creationId xmlns:a16="http://schemas.microsoft.com/office/drawing/2014/main" id="{A655B90C-2244-93CD-D8FB-7D4F029C8B3D}"/>
+              </a:ext>
+            </a:extLst>
+          </p:cNvPr>
+          <p:cNvSpPr/>
+          <p:nvPr/>
+        </p:nvSpPr>
+        <p:spPr>
+          <a:xfrm>
+            <a:off x="16604517" y="11362965"/>
+            <a:ext cx="1819398" cy="877223"/>
+          </a:xfrm>
+          <a:prstGeom prst="rect">
+            <a:avLst/>
+          </a:prstGeom>
+          <a:solidFill>
+            <a:schemeClr val="bg1"/>
+          </a:solidFill>
+          <a:ln w="38100">
+            <a:solidFill>
+              <a:schemeClr val="tx1"/>
+            </a:solidFill>
+          </a:ln>
+        </p:spPr>
+        <p:style>
+          <a:lnRef idx="2">
+            <a:schemeClr val="accent1">
+              <a:shade val="50000"/>
+            </a:schemeClr>
+          </a:lnRef>
+          <a:fillRef idx="1">
+            <a:schemeClr val="accent1"/>
+          </a:fillRef>
+          <a:effectRef idx="0">
+            <a:schemeClr val="accent1"/>
+          </a:effectRef>
+          <a:fontRef idx="minor">
+            <a:schemeClr val="lt1"/>
+          </a:fontRef>
+        </p:style>
+        <p:txBody>
+          <a:bodyPr rtlCol="0" anchor="ctr"/>
+          <a:lstStyle/>
+          <a:p>
+            <a:pPr algn="ctr"/>
+            <a:r>
+              <a:rPr lang="en-US" sz="2400" b="1" i="1" dirty="0">
+                <a:solidFill>
+                  <a:schemeClr val="tx1"/>
+                </a:solidFill>
+                <a:latin typeface="Arial" panose="020B0604020202020204" pitchFamily="34" charset="0"/>
+                <a:cs typeface="Arial" panose="020B0604020202020204" pitchFamily="34" charset="0"/>
+              </a:rPr>
+              <a:t>N</a:t>
+            </a:r>
+            <a:r>
+              <a:rPr lang="en-US" sz="2400" b="1" baseline="-25000" dirty="0">
+                <a:solidFill>
+                  <a:schemeClr val="tx1"/>
+                </a:solidFill>
+                <a:latin typeface="Arial" panose="020B0604020202020204" pitchFamily="34" charset="0"/>
+                <a:cs typeface="Arial" panose="020B0604020202020204" pitchFamily="34" charset="0"/>
+              </a:rPr>
+              <a:t>mass</a:t>
+            </a:r>
+            <a:endParaRPr lang="en-US" sz="2400" b="1" i="1" dirty="0">
+              <a:solidFill>
+                <a:schemeClr val="tx1"/>
+              </a:solidFill>
+              <a:latin typeface="Arial" panose="020B0604020202020204" pitchFamily="34" charset="0"/>
+              <a:cs typeface="Arial" panose="020B0604020202020204" pitchFamily="34" charset="0"/>
+            </a:endParaRPr>
+          </a:p>
+        </p:txBody>
+      </p:sp>
+      <p:sp>
+        <p:nvSpPr>
+          <p:cNvPr id="141" name="TextBox 140">
+            <a:extLst>
+              <a:ext uri="{FF2B5EF4-FFF2-40B4-BE49-F238E27FC236}">
+                <a16:creationId xmlns:a16="http://schemas.microsoft.com/office/drawing/2014/main" id="{EC75B992-F2B7-7557-142E-D6B514093A11}"/>
+              </a:ext>
+            </a:extLst>
+          </p:cNvPr>
+          <p:cNvSpPr txBox="1"/>
+          <p:nvPr/>
+        </p:nvSpPr>
+        <p:spPr>
+          <a:xfrm>
+            <a:off x="7170675" y="7431412"/>
+            <a:ext cx="7273466" cy="400110"/>
+          </a:xfrm>
+          <a:prstGeom prst="rect">
+            <a:avLst/>
+          </a:prstGeom>
+          <a:solidFill>
+            <a:schemeClr val="bg1"/>
+          </a:solidFill>
+          <a:ln w="19050">
+            <a:solidFill>
+              <a:schemeClr val="tx1"/>
+            </a:solidFill>
+          </a:ln>
+        </p:spPr>
+        <p:txBody>
+          <a:bodyPr wrap="none" rtlCol="0">
+            <a:spAutoFit/>
+          </a:bodyPr>
+          <a:lstStyle/>
+          <a:p>
+            <a:r>
+              <a:rPr lang="en-US" sz="2000" dirty="0">
+                <a:latin typeface="Arial" panose="020B0604020202020204" pitchFamily="34" charset="0"/>
+                <a:cs typeface="Arial" panose="020B0604020202020204" pitchFamily="34" charset="0"/>
+              </a:rPr>
+              <a:t>Fisher’s </a:t>
+            </a:r>
+            <a:r>
+              <a:rPr lang="en-US" sz="2000" i="1" dirty="0">
+                <a:latin typeface="Arial" panose="020B0604020202020204" pitchFamily="34" charset="0"/>
+                <a:cs typeface="Arial" panose="020B0604020202020204" pitchFamily="34" charset="0"/>
+              </a:rPr>
+              <a:t>C</a:t>
+            </a:r>
+            <a:r>
+              <a:rPr lang="en-US" sz="2000" dirty="0">
+                <a:latin typeface="Arial" panose="020B0604020202020204" pitchFamily="34" charset="0"/>
+                <a:cs typeface="Arial" panose="020B0604020202020204" pitchFamily="34" charset="0"/>
+              </a:rPr>
+              <a:t>=17.740, </a:t>
+            </a:r>
+            <a:r>
+              <a:rPr lang="en-US" sz="2000" i="1" dirty="0">
+                <a:latin typeface="Arial" panose="020B0604020202020204" pitchFamily="34" charset="0"/>
+                <a:cs typeface="Arial" panose="020B0604020202020204" pitchFamily="34" charset="0"/>
+              </a:rPr>
+              <a:t>p</a:t>
+            </a:r>
+            <a:r>
+              <a:rPr lang="en-US" sz="2000" dirty="0">
+                <a:latin typeface="Arial" panose="020B0604020202020204" pitchFamily="34" charset="0"/>
+                <a:cs typeface="Arial" panose="020B0604020202020204" pitchFamily="34" charset="0"/>
+              </a:rPr>
+              <a:t>=0.339, df=16, AIC=77.740, BIC=188.247</a:t>
+            </a:r>
+          </a:p>
+        </p:txBody>
+      </p:sp>
+      <p:sp>
+        <p:nvSpPr>
+          <p:cNvPr id="142" name="TextBox 141">
+            <a:extLst>
+              <a:ext uri="{FF2B5EF4-FFF2-40B4-BE49-F238E27FC236}">
+                <a16:creationId xmlns:a16="http://schemas.microsoft.com/office/drawing/2014/main" id="{977F5606-C18A-FCDA-53AA-381312569199}"/>
+              </a:ext>
+            </a:extLst>
+          </p:cNvPr>
+          <p:cNvSpPr txBox="1"/>
+          <p:nvPr/>
+        </p:nvSpPr>
+        <p:spPr>
+          <a:xfrm>
+            <a:off x="7170675" y="15068776"/>
+            <a:ext cx="7130798" cy="400110"/>
+          </a:xfrm>
+          <a:prstGeom prst="rect">
+            <a:avLst/>
+          </a:prstGeom>
+          <a:solidFill>
+            <a:schemeClr val="bg1"/>
+          </a:solidFill>
+          <a:ln w="19050">
+            <a:solidFill>
+              <a:schemeClr val="tx1"/>
+            </a:solidFill>
+          </a:ln>
+        </p:spPr>
+        <p:txBody>
+          <a:bodyPr wrap="none" rtlCol="0">
+            <a:spAutoFit/>
+          </a:bodyPr>
+          <a:lstStyle/>
+          <a:p>
+            <a:r>
+              <a:rPr lang="en-US" sz="2000" dirty="0">
+                <a:latin typeface="Arial" panose="020B0604020202020204" pitchFamily="34" charset="0"/>
+                <a:cs typeface="Arial" panose="020B0604020202020204" pitchFamily="34" charset="0"/>
+              </a:rPr>
+              <a:t>Fisher’s </a:t>
+            </a:r>
+            <a:r>
+              <a:rPr lang="en-US" sz="2000" i="1" dirty="0">
+                <a:latin typeface="Arial" panose="020B0604020202020204" pitchFamily="34" charset="0"/>
+                <a:cs typeface="Arial" panose="020B0604020202020204" pitchFamily="34" charset="0"/>
+              </a:rPr>
+              <a:t>C</a:t>
+            </a:r>
+            <a:r>
+              <a:rPr lang="en-US" sz="2000" dirty="0">
+                <a:latin typeface="Arial" panose="020B0604020202020204" pitchFamily="34" charset="0"/>
+                <a:cs typeface="Arial" panose="020B0604020202020204" pitchFamily="34" charset="0"/>
+              </a:rPr>
+              <a:t>=9.357, </a:t>
+            </a:r>
+            <a:r>
+              <a:rPr lang="en-US" sz="2000" i="1" dirty="0">
+                <a:latin typeface="Arial" panose="020B0604020202020204" pitchFamily="34" charset="0"/>
+                <a:cs typeface="Arial" panose="020B0604020202020204" pitchFamily="34" charset="0"/>
+              </a:rPr>
+              <a:t>p</a:t>
+            </a:r>
+            <a:r>
+              <a:rPr lang="en-US" sz="2000" dirty="0">
+                <a:latin typeface="Arial" panose="020B0604020202020204" pitchFamily="34" charset="0"/>
+                <a:cs typeface="Arial" panose="020B0604020202020204" pitchFamily="34" charset="0"/>
+              </a:rPr>
+              <a:t>=0.898, df=16, AIC=69.357, BIC=146.598</a:t>
+            </a:r>
+          </a:p>
+        </p:txBody>
+      </p:sp>
+      <p:sp>
+        <p:nvSpPr>
+          <p:cNvPr id="143" name="TextBox 142">
+            <a:extLst>
+              <a:ext uri="{FF2B5EF4-FFF2-40B4-BE49-F238E27FC236}">
+                <a16:creationId xmlns:a16="http://schemas.microsoft.com/office/drawing/2014/main" id="{B79DF2D4-C031-E5C2-22C8-81C6CA72681F}"/>
+              </a:ext>
+            </a:extLst>
+          </p:cNvPr>
+          <p:cNvSpPr txBox="1"/>
+          <p:nvPr/>
+        </p:nvSpPr>
+        <p:spPr>
+          <a:xfrm>
+            <a:off x="5315685" y="464948"/>
+            <a:ext cx="938077" cy="830997"/>
+          </a:xfrm>
+          <a:prstGeom prst="rect">
+            <a:avLst/>
+          </a:prstGeom>
+          <a:noFill/>
+        </p:spPr>
+        <p:txBody>
+          <a:bodyPr wrap="none" rtlCol="0">
+            <a:spAutoFit/>
+          </a:bodyPr>
+          <a:lstStyle/>
+          <a:p>
+            <a:r>
+              <a:rPr lang="en-US" sz="4800" dirty="0">
+                <a:latin typeface="Arial" panose="020B0604020202020204" pitchFamily="34" charset="0"/>
+                <a:cs typeface="Arial" panose="020B0604020202020204" pitchFamily="34" charset="0"/>
+              </a:rPr>
+              <a:t>(a)</a:t>
+            </a:r>
+          </a:p>
+        </p:txBody>
+      </p:sp>
+      <p:sp>
+        <p:nvSpPr>
+          <p:cNvPr id="144" name="TextBox 143">
+            <a:extLst>
+              <a:ext uri="{FF2B5EF4-FFF2-40B4-BE49-F238E27FC236}">
+                <a16:creationId xmlns:a16="http://schemas.microsoft.com/office/drawing/2014/main" id="{658D005A-B0F6-10DD-76F0-A8D13C6103D6}"/>
+              </a:ext>
+            </a:extLst>
+          </p:cNvPr>
+          <p:cNvSpPr txBox="1"/>
+          <p:nvPr/>
+        </p:nvSpPr>
+        <p:spPr>
+          <a:xfrm>
+            <a:off x="5315685" y="8132543"/>
+            <a:ext cx="938077" cy="830997"/>
+          </a:xfrm>
+          <a:prstGeom prst="rect">
+            <a:avLst/>
+          </a:prstGeom>
+          <a:noFill/>
+        </p:spPr>
+        <p:txBody>
+          <a:bodyPr wrap="none" rtlCol="0">
+            <a:spAutoFit/>
+          </a:bodyPr>
+          <a:lstStyle/>
+          <a:p>
+            <a:r>
+              <a:rPr lang="en-US" sz="4800" dirty="0">
+                <a:latin typeface="Arial" panose="020B0604020202020204" pitchFamily="34" charset="0"/>
+                <a:cs typeface="Arial" panose="020B0604020202020204" pitchFamily="34" charset="0"/>
+              </a:rPr>
+              <a:t>(b)</a:t>
+            </a:r>
+          </a:p>
+        </p:txBody>
+      </p:sp>
+      <p:sp>
+        <p:nvSpPr>
+          <p:cNvPr id="22" name="Rectangle 21">
+            <a:extLst>
+              <a:ext uri="{FF2B5EF4-FFF2-40B4-BE49-F238E27FC236}">
+                <a16:creationId xmlns:a16="http://schemas.microsoft.com/office/drawing/2014/main" id="{B65F8E9F-E834-9ABE-9BDB-E4F49A677C70}"/>
+              </a:ext>
+            </a:extLst>
+          </p:cNvPr>
+          <p:cNvSpPr/>
+          <p:nvPr/>
+        </p:nvSpPr>
+        <p:spPr>
+          <a:xfrm>
+            <a:off x="9002017" y="5809849"/>
+            <a:ext cx="2011416" cy="877223"/>
+          </a:xfrm>
+          <a:prstGeom prst="rect">
+            <a:avLst/>
+          </a:prstGeom>
+          <a:solidFill>
+            <a:schemeClr val="bg1"/>
+          </a:solidFill>
+          <a:ln w="38100">
+            <a:solidFill>
+              <a:schemeClr val="tx1"/>
+            </a:solidFill>
+          </a:ln>
+        </p:spPr>
+        <p:style>
+          <a:lnRef idx="2">
+            <a:schemeClr val="accent1">
+              <a:shade val="50000"/>
+            </a:schemeClr>
+          </a:lnRef>
+          <a:fillRef idx="1">
+            <a:schemeClr val="accent1"/>
+          </a:fillRef>
+          <a:effectRef idx="0">
+            <a:schemeClr val="accent1"/>
+          </a:effectRef>
+          <a:fontRef idx="minor">
+            <a:schemeClr val="lt1"/>
+          </a:fontRef>
+        </p:style>
+        <p:txBody>
+          <a:bodyPr rtlCol="0" anchor="ctr"/>
+          <a:lstStyle/>
+          <a:p>
+            <a:pPr algn="ctr"/>
+            <a:r>
+              <a:rPr lang="en-US" sz="2400" b="1" i="1" dirty="0">
+                <a:solidFill>
+                  <a:schemeClr val="tx1"/>
+                </a:solidFill>
+                <a:latin typeface="Arial" panose="020B0604020202020204" pitchFamily="34" charset="0"/>
+                <a:cs typeface="Arial" panose="020B0604020202020204" pitchFamily="34" charset="0"/>
+              </a:rPr>
+              <a:t>N availability</a:t>
+            </a:r>
+            <a:endParaRPr lang="en-US" sz="2400" b="1" dirty="0">
+              <a:solidFill>
+                <a:schemeClr val="tx1"/>
+              </a:solidFill>
+              <a:latin typeface="Arial" panose="020B0604020202020204" pitchFamily="34" charset="0"/>
+              <a:cs typeface="Arial" panose="020B0604020202020204" pitchFamily="34" charset="0"/>
+            </a:endParaRPr>
+          </a:p>
+        </p:txBody>
+      </p:sp>
+      <p:cxnSp>
+        <p:nvCxnSpPr>
+          <p:cNvPr id="27" name="Elbow Connector 26">
+            <a:extLst>
+              <a:ext uri="{FF2B5EF4-FFF2-40B4-BE49-F238E27FC236}">
+                <a16:creationId xmlns:a16="http://schemas.microsoft.com/office/drawing/2014/main" id="{EBA157D6-87D2-8B38-DFEF-790A0FABB301}"/>
+              </a:ext>
+            </a:extLst>
+          </p:cNvPr>
+          <p:cNvCxnSpPr>
+            <a:stCxn id="124" idx="0"/>
+          </p:cNvCxnSpPr>
+          <p:nvPr/>
+        </p:nvCxnSpPr>
+        <p:spPr>
+          <a:xfrm rot="5400000" flipH="1" flipV="1">
+            <a:off x="15527925" y="11348712"/>
+            <a:ext cx="613986" cy="1470785"/>
+          </a:xfrm>
+          <a:prstGeom prst="bentConnector2">
+            <a:avLst/>
+          </a:prstGeom>
+          <a:ln w="6350">
+            <a:solidFill>
+              <a:schemeClr val="tx1"/>
+            </a:solidFill>
+            <a:prstDash val="lgDash"/>
+            <a:tailEnd type="triangle"/>
+          </a:ln>
+        </p:spPr>
+        <p:style>
+          <a:lnRef idx="1">
+            <a:schemeClr val="accent1"/>
+          </a:lnRef>
+          <a:fillRef idx="0">
+            <a:schemeClr val="accent1"/>
+          </a:fillRef>
+          <a:effectRef idx="0">
+            <a:schemeClr val="accent1"/>
+          </a:effectRef>
+          <a:fontRef idx="minor">
+            <a:schemeClr val="tx1"/>
+          </a:fontRef>
+        </p:style>
+      </p:cxnSp>
+      <p:cxnSp>
+        <p:nvCxnSpPr>
+          <p:cNvPr id="29" name="Elbow Connector 28">
+            <a:extLst>
+              <a:ext uri="{FF2B5EF4-FFF2-40B4-BE49-F238E27FC236}">
+                <a16:creationId xmlns:a16="http://schemas.microsoft.com/office/drawing/2014/main" id="{A1A8904F-9C63-BD23-98F4-43E19F530F2B}"/>
+              </a:ext>
+            </a:extLst>
+          </p:cNvPr>
+          <p:cNvCxnSpPr>
+            <a:stCxn id="124" idx="2"/>
+          </p:cNvCxnSpPr>
+          <p:nvPr/>
+        </p:nvCxnSpPr>
+        <p:spPr>
+          <a:xfrm rot="16200000" flipH="1">
+            <a:off x="15517641" y="12850204"/>
+            <a:ext cx="634554" cy="1470785"/>
+          </a:xfrm>
+          <a:prstGeom prst="bentConnector2">
+            <a:avLst/>
+          </a:prstGeom>
+          <a:ln w="6350">
+            <a:solidFill>
+              <a:schemeClr val="tx1"/>
+            </a:solidFill>
+            <a:prstDash val="lgDash"/>
+            <a:tailEnd type="triangle"/>
+          </a:ln>
+        </p:spPr>
+        <p:style>
+          <a:lnRef idx="1">
+            <a:schemeClr val="accent1"/>
+          </a:lnRef>
+          <a:fillRef idx="0">
+            <a:schemeClr val="accent1"/>
+          </a:fillRef>
+          <a:effectRef idx="0">
+            <a:schemeClr val="accent1"/>
+          </a:effectRef>
+          <a:fontRef idx="minor">
+            <a:schemeClr val="tx1"/>
+          </a:fontRef>
+        </p:style>
+      </p:cxnSp>
+      <p:cxnSp>
+        <p:nvCxnSpPr>
+          <p:cNvPr id="30" name="Elbow Connector 29">
+            <a:extLst>
+              <a:ext uri="{FF2B5EF4-FFF2-40B4-BE49-F238E27FC236}">
+                <a16:creationId xmlns:a16="http://schemas.microsoft.com/office/drawing/2014/main" id="{0F8BE9C6-61DD-5512-D9DB-70948F0F8AEA}"/>
+              </a:ext>
+            </a:extLst>
+          </p:cNvPr>
+          <p:cNvCxnSpPr>
+            <a:cxnSpLocks/>
+          </p:cNvCxnSpPr>
+          <p:nvPr/>
+        </p:nvCxnSpPr>
+        <p:spPr>
+          <a:xfrm>
+            <a:off x="10682548" y="11811000"/>
+            <a:ext cx="3658926" cy="559663"/>
+          </a:xfrm>
+          <a:prstGeom prst="bentConnector3">
+            <a:avLst>
+              <a:gd name="adj1" fmla="val 100032"/>
+            </a:avLst>
+          </a:prstGeom>
+          <a:ln w="6350">
+            <a:solidFill>
+              <a:schemeClr val="tx1"/>
+            </a:solidFill>
+            <a:prstDash val="lgDash"/>
+            <a:headEnd type="none"/>
+            <a:tailEnd type="triangle"/>
+          </a:ln>
+        </p:spPr>
+        <p:style>
+          <a:lnRef idx="1">
+            <a:schemeClr val="accent1"/>
+          </a:lnRef>
+          <a:fillRef idx="0">
+            <a:schemeClr val="accent1"/>
+          </a:fillRef>
+          <a:effectRef idx="0">
+            <a:schemeClr val="accent1"/>
+          </a:effectRef>
+          <a:fontRef idx="minor">
+            <a:schemeClr val="tx1"/>
+          </a:fontRef>
+        </p:style>
+      </p:cxnSp>
+      <p:sp>
+        <p:nvSpPr>
+          <p:cNvPr id="125" name="Rectangle 124">
+            <a:extLst>
+              <a:ext uri="{FF2B5EF4-FFF2-40B4-BE49-F238E27FC236}">
+                <a16:creationId xmlns:a16="http://schemas.microsoft.com/office/drawing/2014/main" id="{A0C0FCEF-786B-D1E0-C000-42131D0B07A3}"/>
+              </a:ext>
+            </a:extLst>
+          </p:cNvPr>
+          <p:cNvSpPr/>
+          <p:nvPr/>
+        </p:nvSpPr>
+        <p:spPr>
+          <a:xfrm>
+            <a:off x="9098026" y="11361982"/>
+            <a:ext cx="1819398" cy="877223"/>
+          </a:xfrm>
+          <a:prstGeom prst="rect">
+            <a:avLst/>
+          </a:prstGeom>
+          <a:solidFill>
+            <a:schemeClr val="bg1"/>
+          </a:solidFill>
+          <a:ln w="38100">
+            <a:solidFill>
+              <a:schemeClr val="tx1"/>
+            </a:solidFill>
+          </a:ln>
+        </p:spPr>
+        <p:style>
+          <a:lnRef idx="2">
+            <a:schemeClr val="accent1">
+              <a:shade val="50000"/>
+            </a:schemeClr>
+          </a:lnRef>
+          <a:fillRef idx="1">
+            <a:schemeClr val="accent1"/>
+          </a:fillRef>
+          <a:effectRef idx="0">
+            <a:schemeClr val="accent1"/>
+          </a:effectRef>
+          <a:fontRef idx="minor">
+            <a:schemeClr val="lt1"/>
+          </a:fontRef>
+        </p:style>
+        <p:txBody>
+          <a:bodyPr rtlCol="0" anchor="ctr"/>
+          <a:lstStyle/>
+          <a:p>
+            <a:pPr algn="ctr"/>
+            <a:r>
+              <a:rPr lang="en-US" sz="2400" b="1" i="1" dirty="0">
+                <a:solidFill>
+                  <a:schemeClr val="tx1"/>
+                </a:solidFill>
+                <a:latin typeface="Arial" panose="020B0604020202020204" pitchFamily="34" charset="0"/>
+                <a:cs typeface="Arial" panose="020B0604020202020204" pitchFamily="34" charset="0"/>
+              </a:rPr>
+              <a:t>Soil moisture</a:t>
+            </a:r>
+            <a:endParaRPr lang="en-US" sz="2400" b="1" dirty="0">
+              <a:solidFill>
+                <a:schemeClr val="tx1"/>
+              </a:solidFill>
+              <a:latin typeface="Arial" panose="020B0604020202020204" pitchFamily="34" charset="0"/>
+              <a:cs typeface="Arial" panose="020B0604020202020204" pitchFamily="34" charset="0"/>
+            </a:endParaRPr>
+          </a:p>
+        </p:txBody>
+      </p:sp>
+      <p:grpSp>
+        <p:nvGrpSpPr>
+          <p:cNvPr id="45" name="Group 44">
+            <a:extLst>
+              <a:ext uri="{FF2B5EF4-FFF2-40B4-BE49-F238E27FC236}">
+                <a16:creationId xmlns:a16="http://schemas.microsoft.com/office/drawing/2014/main" id="{04C69F98-27F0-AA7E-4048-E78F4A1B3BFA}"/>
+              </a:ext>
+            </a:extLst>
+          </p:cNvPr>
+          <p:cNvGrpSpPr/>
+          <p:nvPr/>
+        </p:nvGrpSpPr>
+        <p:grpSpPr>
+          <a:xfrm>
+            <a:off x="10049956" y="16314463"/>
+            <a:ext cx="7365553" cy="1333409"/>
+            <a:chOff x="10559644" y="16560396"/>
+            <a:chExt cx="7365553" cy="1333409"/>
+          </a:xfrm>
+        </p:grpSpPr>
+        <p:sp>
+          <p:nvSpPr>
+            <p:cNvPr id="39" name="TextBox 38">
+              <a:extLst>
+                <a:ext uri="{FF2B5EF4-FFF2-40B4-BE49-F238E27FC236}">
+                  <a16:creationId xmlns:a16="http://schemas.microsoft.com/office/drawing/2014/main" id="{39E098F6-F9A1-FFBC-5277-F90DC8998717}"/>
+                </a:ext>
+              </a:extLst>
+            </p:cNvPr>
+            <p:cNvSpPr txBox="1"/>
+            <p:nvPr/>
+          </p:nvSpPr>
+          <p:spPr>
+            <a:xfrm>
+              <a:off x="17090476" y="16745139"/>
+              <a:ext cx="718466" cy="553998"/>
+            </a:xfrm>
+            <a:prstGeom prst="rect">
+              <a:avLst/>
+            </a:prstGeom>
+            <a:noFill/>
+          </p:spPr>
+          <p:txBody>
+            <a:bodyPr wrap="none" rtlCol="0">
+              <a:spAutoFit/>
+            </a:bodyPr>
+            <a:lstStyle/>
+            <a:p>
+              <a:r>
+                <a:rPr lang="en-US" sz="3000" b="1" dirty="0">
+                  <a:latin typeface="Arial" panose="020B0604020202020204" pitchFamily="34" charset="0"/>
+                  <a:cs typeface="Arial" panose="020B0604020202020204" pitchFamily="34" charset="0"/>
+                </a:rPr>
+                <a:t>NS</a:t>
+              </a:r>
+            </a:p>
+          </p:txBody>
+        </p:sp>
+        <p:grpSp>
+          <p:nvGrpSpPr>
+            <p:cNvPr id="67" name="Group 66">
+              <a:extLst>
+                <a:ext uri="{FF2B5EF4-FFF2-40B4-BE49-F238E27FC236}">
+                  <a16:creationId xmlns:a16="http://schemas.microsoft.com/office/drawing/2014/main" id="{A35F5F89-CB71-57A8-231D-10EC8166F377}"/>
+                </a:ext>
+              </a:extLst>
+            </p:cNvPr>
+            <p:cNvGrpSpPr/>
+            <p:nvPr/>
+          </p:nvGrpSpPr>
+          <p:grpSpPr>
+            <a:xfrm>
+              <a:off x="10559644" y="16560396"/>
+              <a:ext cx="7208824" cy="1333409"/>
+              <a:chOff x="9836749" y="13266385"/>
+              <a:chExt cx="7208824" cy="1333409"/>
+            </a:xfrm>
+          </p:grpSpPr>
+          <p:cxnSp>
+            <p:nvCxnSpPr>
+              <p:cNvPr id="68" name="Straight Connector 67">
+                <a:extLst>
+                  <a:ext uri="{FF2B5EF4-FFF2-40B4-BE49-F238E27FC236}">
+                    <a16:creationId xmlns:a16="http://schemas.microsoft.com/office/drawing/2014/main" id="{42DE8418-4689-FB6B-7870-ADE273C57A05}"/>
+                  </a:ext>
+                </a:extLst>
+              </p:cNvPr>
+              <p:cNvCxnSpPr>
+                <a:cxnSpLocks/>
+              </p:cNvCxnSpPr>
+              <p:nvPr/>
+            </p:nvCxnSpPr>
+            <p:spPr>
+              <a:xfrm>
+                <a:off x="11510490" y="13425953"/>
+                <a:ext cx="951115" cy="0"/>
+              </a:xfrm>
+              <a:prstGeom prst="line">
+                <a:avLst/>
+              </a:prstGeom>
+              <a:ln w="95250">
+                <a:solidFill>
+                  <a:srgbClr val="C00000"/>
+                </a:solidFill>
+              </a:ln>
+            </p:spPr>
+            <p:style>
+              <a:lnRef idx="1">
+                <a:schemeClr val="accent1"/>
+              </a:lnRef>
+              <a:fillRef idx="0">
+                <a:schemeClr val="accent1"/>
+              </a:fillRef>
+              <a:effectRef idx="0">
+                <a:schemeClr val="accent1"/>
+              </a:effectRef>
+              <a:fontRef idx="minor">
+                <a:schemeClr val="tx1"/>
+              </a:fontRef>
+            </p:style>
+          </p:cxnSp>
+          <p:cxnSp>
+            <p:nvCxnSpPr>
+              <p:cNvPr id="69" name="Straight Connector 68">
+                <a:extLst>
+                  <a:ext uri="{FF2B5EF4-FFF2-40B4-BE49-F238E27FC236}">
+                    <a16:creationId xmlns:a16="http://schemas.microsoft.com/office/drawing/2014/main" id="{D21DCA6D-8B6C-2641-C4D5-09059CC1D6B7}"/>
+                  </a:ext>
+                </a:extLst>
+              </p:cNvPr>
+              <p:cNvCxnSpPr>
+                <a:cxnSpLocks/>
+              </p:cNvCxnSpPr>
+              <p:nvPr/>
+            </p:nvCxnSpPr>
+            <p:spPr>
+              <a:xfrm>
+                <a:off x="10577418" y="13446974"/>
+                <a:ext cx="951115" cy="0"/>
+              </a:xfrm>
+              <a:prstGeom prst="line">
+                <a:avLst/>
+              </a:prstGeom>
+              <a:ln w="47625">
+                <a:solidFill>
+                  <a:srgbClr val="C00000"/>
+                </a:solidFill>
+              </a:ln>
+            </p:spPr>
+            <p:style>
+              <a:lnRef idx="1">
+                <a:schemeClr val="accent1"/>
+              </a:lnRef>
+              <a:fillRef idx="0">
+                <a:schemeClr val="accent1"/>
+              </a:fillRef>
+              <a:effectRef idx="0">
+                <a:schemeClr val="accent1"/>
+              </a:effectRef>
+              <a:fontRef idx="minor">
+                <a:schemeClr val="tx1"/>
+              </a:fontRef>
+            </p:style>
+          </p:cxnSp>
+          <p:cxnSp>
+            <p:nvCxnSpPr>
+              <p:cNvPr id="70" name="Straight Connector 69">
+                <a:extLst>
+                  <a:ext uri="{FF2B5EF4-FFF2-40B4-BE49-F238E27FC236}">
+                    <a16:creationId xmlns:a16="http://schemas.microsoft.com/office/drawing/2014/main" id="{DC2C5DCC-A7CE-C125-60CB-7DA44DAD98C9}"/>
+                  </a:ext>
+                </a:extLst>
+              </p:cNvPr>
+              <p:cNvCxnSpPr>
+                <a:cxnSpLocks/>
+              </p:cNvCxnSpPr>
+              <p:nvPr/>
+            </p:nvCxnSpPr>
+            <p:spPr>
+              <a:xfrm>
+                <a:off x="14349853" y="13429128"/>
+                <a:ext cx="951115" cy="0"/>
+              </a:xfrm>
+              <a:prstGeom prst="line">
+                <a:avLst/>
+              </a:prstGeom>
+              <a:ln w="95250">
+                <a:solidFill>
+                  <a:schemeClr val="accent1">
+                    <a:lumMod val="75000"/>
+                  </a:schemeClr>
+                </a:solidFill>
+              </a:ln>
+            </p:spPr>
+            <p:style>
+              <a:lnRef idx="1">
+                <a:schemeClr val="accent1"/>
+              </a:lnRef>
+              <a:fillRef idx="0">
+                <a:schemeClr val="accent1"/>
+              </a:fillRef>
+              <a:effectRef idx="0">
+                <a:schemeClr val="accent1"/>
+              </a:effectRef>
+              <a:fontRef idx="minor">
+                <a:schemeClr val="tx1"/>
+              </a:fontRef>
+            </p:style>
+          </p:cxnSp>
+          <p:cxnSp>
+            <p:nvCxnSpPr>
+              <p:cNvPr id="71" name="Straight Connector 70">
+                <a:extLst>
+                  <a:ext uri="{FF2B5EF4-FFF2-40B4-BE49-F238E27FC236}">
+                    <a16:creationId xmlns:a16="http://schemas.microsoft.com/office/drawing/2014/main" id="{36A6FC25-6D7B-5EAC-158D-94ACC523697E}"/>
+                  </a:ext>
+                </a:extLst>
+              </p:cNvPr>
+              <p:cNvCxnSpPr>
+                <a:cxnSpLocks/>
+              </p:cNvCxnSpPr>
+              <p:nvPr/>
+            </p:nvCxnSpPr>
+            <p:spPr>
+              <a:xfrm>
+                <a:off x="15297410" y="13451128"/>
+                <a:ext cx="951115" cy="0"/>
+              </a:xfrm>
+              <a:prstGeom prst="line">
+                <a:avLst/>
+              </a:prstGeom>
+              <a:ln w="47625">
+                <a:solidFill>
+                  <a:schemeClr val="accent1">
+                    <a:lumMod val="75000"/>
+                  </a:schemeClr>
+                </a:solidFill>
+              </a:ln>
+            </p:spPr>
+            <p:style>
+              <a:lnRef idx="1">
+                <a:schemeClr val="accent1"/>
+              </a:lnRef>
+              <a:fillRef idx="0">
+                <a:schemeClr val="accent1"/>
+              </a:fillRef>
+              <a:effectRef idx="0">
+                <a:schemeClr val="accent1"/>
+              </a:effectRef>
+              <a:fontRef idx="minor">
+                <a:schemeClr val="tx1"/>
+              </a:fontRef>
+            </p:style>
+          </p:cxnSp>
+          <p:sp>
+            <p:nvSpPr>
+              <p:cNvPr id="72" name="TextBox 71">
+                <a:extLst>
+                  <a:ext uri="{FF2B5EF4-FFF2-40B4-BE49-F238E27FC236}">
+                    <a16:creationId xmlns:a16="http://schemas.microsoft.com/office/drawing/2014/main" id="{8C128DBA-6FF7-F48F-3576-6E4E54C77B35}"/>
+                  </a:ext>
+                </a:extLst>
+              </p:cNvPr>
+              <p:cNvSpPr txBox="1"/>
+              <p:nvPr/>
+            </p:nvSpPr>
+            <p:spPr>
+              <a:xfrm>
+                <a:off x="12510871" y="13433721"/>
+                <a:ext cx="846707" cy="553998"/>
+              </a:xfrm>
+              <a:prstGeom prst="rect">
+                <a:avLst/>
+              </a:prstGeom>
+              <a:noFill/>
+            </p:spPr>
+            <p:txBody>
+              <a:bodyPr wrap="none" rtlCol="0">
+                <a:spAutoFit/>
+              </a:bodyPr>
+              <a:lstStyle/>
+              <a:p>
+                <a:r>
+                  <a:rPr lang="en-US" sz="3000" b="1" dirty="0">
+                    <a:latin typeface="Arial" panose="020B0604020202020204" pitchFamily="34" charset="0"/>
+                    <a:cs typeface="Arial" panose="020B0604020202020204" pitchFamily="34" charset="0"/>
+                  </a:rPr>
+                  <a:t>-0.9</a:t>
+                </a:r>
+              </a:p>
+            </p:txBody>
+          </p:sp>
+          <p:sp>
+            <p:nvSpPr>
+              <p:cNvPr id="73" name="TextBox 72">
+                <a:extLst>
+                  <a:ext uri="{FF2B5EF4-FFF2-40B4-BE49-F238E27FC236}">
+                    <a16:creationId xmlns:a16="http://schemas.microsoft.com/office/drawing/2014/main" id="{DA28404B-CB1C-3AA7-D1D1-31D8CAB2BE1C}"/>
+                  </a:ext>
+                </a:extLst>
+              </p:cNvPr>
+              <p:cNvSpPr txBox="1"/>
+              <p:nvPr/>
+            </p:nvSpPr>
+            <p:spPr>
+              <a:xfrm>
+                <a:off x="13501953" y="13440763"/>
+                <a:ext cx="718466" cy="553998"/>
+              </a:xfrm>
+              <a:prstGeom prst="rect">
+                <a:avLst/>
+              </a:prstGeom>
+              <a:noFill/>
+            </p:spPr>
+            <p:txBody>
+              <a:bodyPr wrap="none" rtlCol="0">
+                <a:spAutoFit/>
+              </a:bodyPr>
+              <a:lstStyle/>
+              <a:p>
+                <a:r>
+                  <a:rPr lang="en-US" sz="3000" b="1" dirty="0">
+                    <a:latin typeface="Arial" panose="020B0604020202020204" pitchFamily="34" charset="0"/>
+                    <a:cs typeface="Arial" panose="020B0604020202020204" pitchFamily="34" charset="0"/>
+                  </a:rPr>
+                  <a:t>0.9</a:t>
+                </a:r>
+              </a:p>
+            </p:txBody>
+          </p:sp>
+          <p:sp>
+            <p:nvSpPr>
+              <p:cNvPr id="74" name="TextBox 73">
+                <a:extLst>
+                  <a:ext uri="{FF2B5EF4-FFF2-40B4-BE49-F238E27FC236}">
+                    <a16:creationId xmlns:a16="http://schemas.microsoft.com/office/drawing/2014/main" id="{AFF09DA8-E5E3-A4BE-EE7A-3E2E24E151FA}"/>
+                  </a:ext>
+                </a:extLst>
+              </p:cNvPr>
+              <p:cNvSpPr txBox="1"/>
+              <p:nvPr/>
+            </p:nvSpPr>
+            <p:spPr>
+              <a:xfrm>
+                <a:off x="11560010" y="13440763"/>
+                <a:ext cx="846707" cy="553998"/>
+              </a:xfrm>
+              <a:prstGeom prst="rect">
+                <a:avLst/>
+              </a:prstGeom>
+              <a:noFill/>
+            </p:spPr>
+            <p:txBody>
+              <a:bodyPr wrap="none" rtlCol="0">
+                <a:spAutoFit/>
+              </a:bodyPr>
+              <a:lstStyle/>
+              <a:p>
+                <a:r>
+                  <a:rPr lang="en-US" sz="3000" b="1" dirty="0">
+                    <a:latin typeface="Arial" panose="020B0604020202020204" pitchFamily="34" charset="0"/>
+                    <a:cs typeface="Arial" panose="020B0604020202020204" pitchFamily="34" charset="0"/>
+                  </a:rPr>
+                  <a:t>-0.6</a:t>
+                </a:r>
+              </a:p>
+            </p:txBody>
+          </p:sp>
+          <p:sp>
+            <p:nvSpPr>
+              <p:cNvPr id="75" name="TextBox 74">
+                <a:extLst>
+                  <a:ext uri="{FF2B5EF4-FFF2-40B4-BE49-F238E27FC236}">
+                    <a16:creationId xmlns:a16="http://schemas.microsoft.com/office/drawing/2014/main" id="{3B8A9511-CB31-E574-991E-18E527801199}"/>
+                  </a:ext>
+                </a:extLst>
+              </p:cNvPr>
+              <p:cNvSpPr txBox="1"/>
+              <p:nvPr/>
+            </p:nvSpPr>
+            <p:spPr>
+              <a:xfrm>
+                <a:off x="14475866" y="13444216"/>
+                <a:ext cx="718466" cy="553998"/>
+              </a:xfrm>
+              <a:prstGeom prst="rect">
+                <a:avLst/>
+              </a:prstGeom>
+              <a:noFill/>
+            </p:spPr>
+            <p:txBody>
+              <a:bodyPr wrap="none" rtlCol="0">
+                <a:spAutoFit/>
+              </a:bodyPr>
+              <a:lstStyle/>
+              <a:p>
+                <a:r>
+                  <a:rPr lang="en-US" sz="3000" b="1" dirty="0">
+                    <a:latin typeface="Arial" panose="020B0604020202020204" pitchFamily="34" charset="0"/>
+                    <a:cs typeface="Arial" panose="020B0604020202020204" pitchFamily="34" charset="0"/>
+                  </a:rPr>
+                  <a:t>0.6</a:t>
+                </a:r>
+              </a:p>
+            </p:txBody>
+          </p:sp>
+          <p:sp>
+            <p:nvSpPr>
+              <p:cNvPr id="76" name="TextBox 75">
+                <a:extLst>
+                  <a:ext uri="{FF2B5EF4-FFF2-40B4-BE49-F238E27FC236}">
+                    <a16:creationId xmlns:a16="http://schemas.microsoft.com/office/drawing/2014/main" id="{3B7C6F4F-A41C-E2FF-4F6B-989806B16A3B}"/>
+                  </a:ext>
+                </a:extLst>
+              </p:cNvPr>
+              <p:cNvSpPr txBox="1"/>
+              <p:nvPr/>
+            </p:nvSpPr>
+            <p:spPr>
+              <a:xfrm>
+                <a:off x="15416682" y="13426392"/>
+                <a:ext cx="718466" cy="553998"/>
+              </a:xfrm>
+              <a:prstGeom prst="rect">
+                <a:avLst/>
+              </a:prstGeom>
+              <a:noFill/>
+            </p:spPr>
+            <p:txBody>
+              <a:bodyPr wrap="none" rtlCol="0">
+                <a:spAutoFit/>
+              </a:bodyPr>
+              <a:lstStyle/>
+              <a:p>
+                <a:r>
+                  <a:rPr lang="en-US" sz="3000" b="1" dirty="0">
+                    <a:latin typeface="Arial" panose="020B0604020202020204" pitchFamily="34" charset="0"/>
+                    <a:cs typeface="Arial" panose="020B0604020202020204" pitchFamily="34" charset="0"/>
+                  </a:rPr>
+                  <a:t>0.3</a:t>
+                </a:r>
+              </a:p>
+            </p:txBody>
+          </p:sp>
+          <p:sp>
+            <p:nvSpPr>
+              <p:cNvPr id="77" name="TextBox 76">
+                <a:extLst>
+                  <a:ext uri="{FF2B5EF4-FFF2-40B4-BE49-F238E27FC236}">
+                    <a16:creationId xmlns:a16="http://schemas.microsoft.com/office/drawing/2014/main" id="{2E3D2220-E330-23E8-21CC-0C1E6FDBADE8}"/>
+                  </a:ext>
+                </a:extLst>
+              </p:cNvPr>
+              <p:cNvSpPr txBox="1"/>
+              <p:nvPr/>
+            </p:nvSpPr>
+            <p:spPr>
+              <a:xfrm>
+                <a:off x="10624830" y="13445817"/>
+                <a:ext cx="846707" cy="553998"/>
+              </a:xfrm>
+              <a:prstGeom prst="rect">
+                <a:avLst/>
+              </a:prstGeom>
+              <a:noFill/>
+            </p:spPr>
+            <p:txBody>
+              <a:bodyPr wrap="none" rtlCol="0">
+                <a:spAutoFit/>
+              </a:bodyPr>
+              <a:lstStyle/>
+              <a:p>
+                <a:r>
+                  <a:rPr lang="en-US" sz="3000" b="1" dirty="0">
+                    <a:latin typeface="Arial" panose="020B0604020202020204" pitchFamily="34" charset="0"/>
+                    <a:cs typeface="Arial" panose="020B0604020202020204" pitchFamily="34" charset="0"/>
+                  </a:rPr>
+                  <a:t>-0.3</a:t>
+                </a:r>
+              </a:p>
+            </p:txBody>
+          </p:sp>
+          <p:sp>
+            <p:nvSpPr>
+              <p:cNvPr id="78" name="TextBox 77">
+                <a:extLst>
+                  <a:ext uri="{FF2B5EF4-FFF2-40B4-BE49-F238E27FC236}">
+                    <a16:creationId xmlns:a16="http://schemas.microsoft.com/office/drawing/2014/main" id="{9885F1AB-F824-228A-982B-D14BA6ACE5C5}"/>
+                  </a:ext>
+                </a:extLst>
+              </p:cNvPr>
+              <p:cNvSpPr txBox="1"/>
+              <p:nvPr/>
+            </p:nvSpPr>
+            <p:spPr>
+              <a:xfrm>
+                <a:off x="11639882" y="14045796"/>
+                <a:ext cx="4695516" cy="553998"/>
+              </a:xfrm>
+              <a:prstGeom prst="rect">
+                <a:avLst/>
+              </a:prstGeom>
+              <a:noFill/>
+            </p:spPr>
+            <p:txBody>
+              <a:bodyPr wrap="none" rtlCol="0">
+                <a:spAutoFit/>
+              </a:bodyPr>
+              <a:lstStyle/>
+              <a:p>
+                <a:r>
+                  <a:rPr lang="en-US" sz="3000" b="1" dirty="0">
+                    <a:latin typeface="Arial" panose="020B0604020202020204" pitchFamily="34" charset="0"/>
+                    <a:cs typeface="Arial" panose="020B0604020202020204" pitchFamily="34" charset="0"/>
+                  </a:rPr>
+                  <a:t>Standardized Coefficient</a:t>
+                </a:r>
+              </a:p>
+            </p:txBody>
+          </p:sp>
+          <p:cxnSp>
+            <p:nvCxnSpPr>
+              <p:cNvPr id="79" name="Straight Connector 78">
+                <a:extLst>
+                  <a:ext uri="{FF2B5EF4-FFF2-40B4-BE49-F238E27FC236}">
+                    <a16:creationId xmlns:a16="http://schemas.microsoft.com/office/drawing/2014/main" id="{91276440-987C-CD17-7D44-7F813F619A7A}"/>
+                  </a:ext>
+                </a:extLst>
+              </p:cNvPr>
+              <p:cNvCxnSpPr>
+                <a:cxnSpLocks/>
+              </p:cNvCxnSpPr>
+              <p:nvPr/>
+            </p:nvCxnSpPr>
+            <p:spPr>
+              <a:xfrm>
+                <a:off x="12453667" y="13380736"/>
+                <a:ext cx="951115" cy="0"/>
+              </a:xfrm>
+              <a:prstGeom prst="line">
+                <a:avLst/>
+              </a:prstGeom>
+              <a:ln w="190500">
+                <a:solidFill>
+                  <a:srgbClr val="C00000"/>
+                </a:solidFill>
+              </a:ln>
+            </p:spPr>
+            <p:style>
+              <a:lnRef idx="1">
+                <a:schemeClr val="accent1"/>
+              </a:lnRef>
+              <a:fillRef idx="0">
+                <a:schemeClr val="accent1"/>
+              </a:fillRef>
+              <a:effectRef idx="0">
+                <a:schemeClr val="accent1"/>
+              </a:effectRef>
+              <a:fontRef idx="minor">
+                <a:schemeClr val="tx1"/>
+              </a:fontRef>
+            </p:style>
+          </p:cxnSp>
+          <p:cxnSp>
+            <p:nvCxnSpPr>
+              <p:cNvPr id="80" name="Straight Connector 79">
+                <a:extLst>
+                  <a:ext uri="{FF2B5EF4-FFF2-40B4-BE49-F238E27FC236}">
+                    <a16:creationId xmlns:a16="http://schemas.microsoft.com/office/drawing/2014/main" id="{9AFC6632-B70B-DABC-CC60-5F2A412DFCB5}"/>
+                  </a:ext>
+                </a:extLst>
+              </p:cNvPr>
+              <p:cNvCxnSpPr>
+                <a:cxnSpLocks/>
+              </p:cNvCxnSpPr>
+              <p:nvPr/>
+            </p:nvCxnSpPr>
+            <p:spPr>
+              <a:xfrm>
+                <a:off x="13401607" y="13379744"/>
+                <a:ext cx="951115" cy="0"/>
+              </a:xfrm>
+              <a:prstGeom prst="line">
+                <a:avLst/>
+              </a:prstGeom>
+              <a:ln w="190500">
+                <a:solidFill>
+                  <a:schemeClr val="accent1">
+                    <a:lumMod val="75000"/>
+                  </a:schemeClr>
+                </a:solidFill>
+              </a:ln>
+            </p:spPr>
+            <p:style>
+              <a:lnRef idx="1">
+                <a:schemeClr val="accent1"/>
+              </a:lnRef>
+              <a:fillRef idx="0">
+                <a:schemeClr val="accent1"/>
+              </a:fillRef>
+              <a:effectRef idx="0">
+                <a:schemeClr val="accent1"/>
+              </a:effectRef>
+              <a:fontRef idx="minor">
+                <a:schemeClr val="tx1"/>
+              </a:fontRef>
+            </p:style>
+          </p:cxnSp>
+          <p:sp>
+            <p:nvSpPr>
+              <p:cNvPr id="81" name="Rectangle 80">
+                <a:extLst>
+                  <a:ext uri="{FF2B5EF4-FFF2-40B4-BE49-F238E27FC236}">
+                    <a16:creationId xmlns:a16="http://schemas.microsoft.com/office/drawing/2014/main" id="{A4B28BAD-1A63-EDB9-6998-15148941B5BB}"/>
+                  </a:ext>
+                </a:extLst>
+              </p:cNvPr>
+              <p:cNvSpPr/>
+              <p:nvPr/>
+            </p:nvSpPr>
+            <p:spPr>
+              <a:xfrm>
+                <a:off x="10539776" y="13475193"/>
+                <a:ext cx="5751830" cy="56852"/>
+              </a:xfrm>
+              <a:prstGeom prst="rect">
+                <a:avLst/>
+              </a:prstGeom>
+              <a:solidFill>
+                <a:schemeClr val="bg1"/>
+              </a:solidFill>
+              <a:ln>
+                <a:noFill/>
+              </a:ln>
+            </p:spPr>
+            <p:style>
+              <a:lnRef idx="2">
+                <a:schemeClr val="accent1">
+                  <a:shade val="50000"/>
+                </a:schemeClr>
+              </a:lnRef>
+              <a:fillRef idx="1">
+                <a:schemeClr val="accent1"/>
+              </a:fillRef>
+              <a:effectRef idx="0">
+                <a:schemeClr val="accent1"/>
+              </a:effectRef>
+              <a:fontRef idx="minor">
+                <a:schemeClr val="lt1"/>
+              </a:fontRef>
+            </p:style>
+            <p:txBody>
+              <a:bodyPr rtlCol="0" anchor="ctr"/>
+              <a:lstStyle/>
+              <a:p>
+                <a:pPr algn="ctr"/>
+                <a:endParaRPr lang="en-US"/>
+              </a:p>
+            </p:txBody>
+          </p:sp>
+          <p:sp>
+            <p:nvSpPr>
+              <p:cNvPr id="82" name="Rectangle 81">
+                <a:extLst>
+                  <a:ext uri="{FF2B5EF4-FFF2-40B4-BE49-F238E27FC236}">
+                    <a16:creationId xmlns:a16="http://schemas.microsoft.com/office/drawing/2014/main" id="{F378FD2E-5818-492B-EF3C-7D53E7B4D776}"/>
+                  </a:ext>
+                </a:extLst>
+              </p:cNvPr>
+              <p:cNvSpPr/>
+              <p:nvPr/>
+            </p:nvSpPr>
+            <p:spPr>
+              <a:xfrm>
+                <a:off x="9836749" y="13470593"/>
+                <a:ext cx="7010400" cy="45719"/>
+              </a:xfrm>
+              <a:prstGeom prst="rect">
+                <a:avLst/>
+              </a:prstGeom>
+              <a:solidFill>
+                <a:schemeClr val="bg1"/>
+              </a:solidFill>
+              <a:ln>
+                <a:noFill/>
+              </a:ln>
+            </p:spPr>
+            <p:style>
+              <a:lnRef idx="2">
+                <a:schemeClr val="accent1">
+                  <a:shade val="50000"/>
+                </a:schemeClr>
+              </a:lnRef>
+              <a:fillRef idx="1">
+                <a:schemeClr val="accent1"/>
+              </a:fillRef>
+              <a:effectRef idx="0">
+                <a:schemeClr val="accent1"/>
+              </a:effectRef>
+              <a:fontRef idx="minor">
+                <a:schemeClr val="lt1"/>
+              </a:fontRef>
+            </p:style>
+            <p:txBody>
+              <a:bodyPr rtlCol="0" anchor="ctr"/>
+              <a:lstStyle/>
+              <a:p>
+                <a:pPr algn="ctr"/>
+                <a:endParaRPr lang="en-US"/>
+              </a:p>
+            </p:txBody>
+          </p:sp>
+          <p:sp>
+            <p:nvSpPr>
+              <p:cNvPr id="83" name="Rectangle 82">
+                <a:extLst>
+                  <a:ext uri="{FF2B5EF4-FFF2-40B4-BE49-F238E27FC236}">
+                    <a16:creationId xmlns:a16="http://schemas.microsoft.com/office/drawing/2014/main" id="{905F9EDD-1542-0956-888D-D6CB10D4E47C}"/>
+                  </a:ext>
+                </a:extLst>
+              </p:cNvPr>
+              <p:cNvSpPr/>
+              <p:nvPr/>
+            </p:nvSpPr>
+            <p:spPr>
+              <a:xfrm>
+                <a:off x="10035173" y="13266385"/>
+                <a:ext cx="7010400" cy="45719"/>
+              </a:xfrm>
+              <a:prstGeom prst="rect">
+                <a:avLst/>
+              </a:prstGeom>
+              <a:solidFill>
+                <a:schemeClr val="bg1"/>
+              </a:solidFill>
+              <a:ln>
+                <a:noFill/>
+              </a:ln>
+            </p:spPr>
+            <p:style>
+              <a:lnRef idx="2">
+                <a:schemeClr val="accent1">
+                  <a:shade val="50000"/>
+                </a:schemeClr>
+              </a:lnRef>
+              <a:fillRef idx="1">
+                <a:schemeClr val="accent1"/>
+              </a:fillRef>
+              <a:effectRef idx="0">
+                <a:schemeClr val="accent1"/>
+              </a:effectRef>
+              <a:fontRef idx="minor">
+                <a:schemeClr val="lt1"/>
+              </a:fontRef>
+            </p:style>
+            <p:txBody>
+              <a:bodyPr rtlCol="0" anchor="ctr"/>
+              <a:lstStyle/>
+              <a:p>
+                <a:pPr algn="ctr"/>
+                <a:endParaRPr lang="en-US"/>
+              </a:p>
+            </p:txBody>
+          </p:sp>
+        </p:grpSp>
+        <p:cxnSp>
+          <p:nvCxnSpPr>
+            <p:cNvPr id="41" name="Straight Connector 40">
+              <a:extLst>
+                <a:ext uri="{FF2B5EF4-FFF2-40B4-BE49-F238E27FC236}">
+                  <a16:creationId xmlns:a16="http://schemas.microsoft.com/office/drawing/2014/main" id="{4D99F997-C3A2-8602-122D-B4B0225C9CF5}"/>
+                </a:ext>
+              </a:extLst>
+            </p:cNvPr>
+            <p:cNvCxnSpPr>
+              <a:cxnSpLocks/>
+            </p:cNvCxnSpPr>
+            <p:nvPr/>
+          </p:nvCxnSpPr>
+          <p:spPr>
+            <a:xfrm>
+              <a:off x="16974221" y="16750749"/>
+              <a:ext cx="950976" cy="0"/>
+            </a:xfrm>
+            <a:prstGeom prst="line">
+              <a:avLst/>
+            </a:prstGeom>
+            <a:ln>
+              <a:solidFill>
+                <a:schemeClr val="tx1"/>
+              </a:solidFill>
+              <a:prstDash val="lgDash"/>
+            </a:ln>
+          </p:spPr>
+          <p:style>
+            <a:lnRef idx="1">
+              <a:schemeClr val="accent1"/>
+            </a:lnRef>
+            <a:fillRef idx="0">
+              <a:schemeClr val="accent1"/>
+            </a:fillRef>
+            <a:effectRef idx="0">
+              <a:schemeClr val="accent1"/>
+            </a:effectRef>
+            <a:fontRef idx="minor">
+              <a:schemeClr val="tx1"/>
+            </a:fontRef>
+          </p:style>
+        </p:cxnSp>
+      </p:grpSp>
+      <p:cxnSp>
+        <p:nvCxnSpPr>
+          <p:cNvPr id="12" name="Elbow Connector 11">
+            <a:extLst>
+              <a:ext uri="{FF2B5EF4-FFF2-40B4-BE49-F238E27FC236}">
+                <a16:creationId xmlns:a16="http://schemas.microsoft.com/office/drawing/2014/main" id="{988D3190-D4A2-21AC-AD22-74FE036646F8}"/>
+              </a:ext>
+            </a:extLst>
+          </p:cNvPr>
+          <p:cNvCxnSpPr>
+            <a:cxnSpLocks/>
+            <a:stCxn id="23" idx="2"/>
+          </p:cNvCxnSpPr>
+          <p:nvPr/>
+        </p:nvCxnSpPr>
+        <p:spPr>
+          <a:xfrm rot="16200000" flipH="1">
+            <a:off x="10557720" y="4024117"/>
+            <a:ext cx="358513" cy="1458503"/>
+          </a:xfrm>
+          <a:prstGeom prst="bentConnector2">
+            <a:avLst/>
+          </a:prstGeom>
+          <a:ln w="35306">
+            <a:solidFill>
+              <a:schemeClr val="accent1">
+                <a:lumMod val="75000"/>
+              </a:schemeClr>
+            </a:solidFill>
+            <a:prstDash val="solid"/>
+            <a:headEnd type="none"/>
+            <a:tailEnd type="triangle"/>
+          </a:ln>
+        </p:spPr>
+        <p:style>
+          <a:lnRef idx="1">
+            <a:schemeClr val="accent1"/>
+          </a:lnRef>
+          <a:fillRef idx="0">
+            <a:schemeClr val="accent1"/>
+          </a:fillRef>
+          <a:effectRef idx="0">
+            <a:schemeClr val="accent1"/>
+          </a:effectRef>
+          <a:fontRef idx="minor">
+            <a:schemeClr val="tx1"/>
+          </a:fontRef>
+        </p:style>
+      </p:cxnSp>
+      <p:cxnSp>
+        <p:nvCxnSpPr>
+          <p:cNvPr id="35" name="Elbow Connector 34">
+            <a:extLst>
+              <a:ext uri="{FF2B5EF4-FFF2-40B4-BE49-F238E27FC236}">
+                <a16:creationId xmlns:a16="http://schemas.microsoft.com/office/drawing/2014/main" id="{376D494D-2D9F-15FC-1EF1-8E00AC5D0AD2}"/>
+              </a:ext>
+            </a:extLst>
+          </p:cNvPr>
+          <p:cNvCxnSpPr>
+            <a:cxnSpLocks/>
+          </p:cNvCxnSpPr>
+          <p:nvPr/>
+        </p:nvCxnSpPr>
+        <p:spPr>
+          <a:xfrm flipV="1">
+            <a:off x="10624673" y="13275675"/>
+            <a:ext cx="3726379" cy="639746"/>
+          </a:xfrm>
+          <a:prstGeom prst="bentConnector3">
+            <a:avLst>
+              <a:gd name="adj1" fmla="val 100009"/>
+            </a:avLst>
+          </a:prstGeom>
+          <a:ln w="6350">
+            <a:solidFill>
+              <a:schemeClr val="tx1"/>
+            </a:solidFill>
+            <a:prstDash val="lgDash"/>
+            <a:headEnd type="none"/>
+            <a:tailEnd type="triangle"/>
+          </a:ln>
+        </p:spPr>
+        <p:style>
+          <a:lnRef idx="1">
+            <a:schemeClr val="accent1"/>
+          </a:lnRef>
+          <a:fillRef idx="0">
+            <a:schemeClr val="accent1"/>
+          </a:fillRef>
+          <a:effectRef idx="0">
+            <a:schemeClr val="accent1"/>
+          </a:effectRef>
+          <a:fontRef idx="minor">
+            <a:schemeClr val="tx1"/>
+          </a:fontRef>
+        </p:style>
+      </p:cxnSp>
+      <p:sp>
+        <p:nvSpPr>
+          <p:cNvPr id="133" name="Rectangle 132">
+            <a:extLst>
+              <a:ext uri="{FF2B5EF4-FFF2-40B4-BE49-F238E27FC236}">
+                <a16:creationId xmlns:a16="http://schemas.microsoft.com/office/drawing/2014/main" id="{E5EBCBF3-8953-20A8-A43E-D6385DA62535}"/>
+              </a:ext>
+            </a:extLst>
+          </p:cNvPr>
+          <p:cNvSpPr/>
+          <p:nvPr/>
+        </p:nvSpPr>
+        <p:spPr>
+          <a:xfrm>
+            <a:off x="9002017" y="13474941"/>
+            <a:ext cx="2011416" cy="877223"/>
+          </a:xfrm>
+          <a:prstGeom prst="rect">
+            <a:avLst/>
+          </a:prstGeom>
+          <a:solidFill>
+            <a:schemeClr val="bg1"/>
+          </a:solidFill>
+          <a:ln w="38100">
+            <a:solidFill>
+              <a:schemeClr val="tx1"/>
+            </a:solidFill>
+          </a:ln>
+        </p:spPr>
+        <p:style>
+          <a:lnRef idx="2">
+            <a:schemeClr val="accent1">
+              <a:shade val="50000"/>
+            </a:schemeClr>
+          </a:lnRef>
+          <a:fillRef idx="1">
+            <a:schemeClr val="accent1"/>
+          </a:fillRef>
+          <a:effectRef idx="0">
+            <a:schemeClr val="accent1"/>
+          </a:effectRef>
+          <a:fontRef idx="minor">
+            <a:schemeClr val="lt1"/>
+          </a:fontRef>
+        </p:style>
+        <p:txBody>
+          <a:bodyPr rtlCol="0" anchor="ctr"/>
+          <a:lstStyle/>
+          <a:p>
+            <a:pPr algn="ctr"/>
+            <a:r>
+              <a:rPr lang="en-US" sz="2400" b="1" i="1" dirty="0">
+                <a:solidFill>
+                  <a:schemeClr val="tx1"/>
+                </a:solidFill>
+                <a:latin typeface="Arial" panose="020B0604020202020204" pitchFamily="34" charset="0"/>
+                <a:cs typeface="Arial" panose="020B0604020202020204" pitchFamily="34" charset="0"/>
+              </a:rPr>
+              <a:t>N availability</a:t>
+            </a:r>
+            <a:endParaRPr lang="en-US" sz="2400" b="1" dirty="0">
+              <a:solidFill>
+                <a:schemeClr val="tx1"/>
+              </a:solidFill>
+              <a:latin typeface="Arial" panose="020B0604020202020204" pitchFamily="34" charset="0"/>
+              <a:cs typeface="Arial" panose="020B0604020202020204" pitchFamily="34" charset="0"/>
+            </a:endParaRPr>
+          </a:p>
+        </p:txBody>
+      </p:sp>
+      <p:sp>
+        <p:nvSpPr>
+          <p:cNvPr id="23" name="Rectangle 22">
+            <a:extLst>
+              <a:ext uri="{FF2B5EF4-FFF2-40B4-BE49-F238E27FC236}">
+                <a16:creationId xmlns:a16="http://schemas.microsoft.com/office/drawing/2014/main" id="{6F806E9B-62B4-25CB-687A-823A5B501D03}"/>
+              </a:ext>
+            </a:extLst>
+          </p:cNvPr>
+          <p:cNvSpPr/>
+          <p:nvPr/>
+        </p:nvSpPr>
+        <p:spPr>
+          <a:xfrm>
+            <a:off x="9098026" y="3696890"/>
+            <a:ext cx="1819398" cy="877223"/>
+          </a:xfrm>
+          <a:prstGeom prst="rect">
+            <a:avLst/>
+          </a:prstGeom>
+          <a:solidFill>
+            <a:schemeClr val="bg1"/>
+          </a:solidFill>
+          <a:ln w="38100">
+            <a:solidFill>
+              <a:schemeClr val="tx1"/>
+            </a:solidFill>
+          </a:ln>
+        </p:spPr>
+        <p:style>
+          <a:lnRef idx="2">
+            <a:schemeClr val="accent1">
+              <a:shade val="50000"/>
+            </a:schemeClr>
+          </a:lnRef>
+          <a:fillRef idx="1">
+            <a:schemeClr val="accent1"/>
+          </a:fillRef>
+          <a:effectRef idx="0">
+            <a:schemeClr val="accent1"/>
+          </a:effectRef>
+          <a:fontRef idx="minor">
+            <a:schemeClr val="lt1"/>
+          </a:fontRef>
+        </p:style>
+        <p:txBody>
+          <a:bodyPr rtlCol="0" anchor="ctr"/>
+          <a:lstStyle/>
+          <a:p>
+            <a:pPr algn="ctr"/>
+            <a:r>
+              <a:rPr lang="en-US" sz="2400" b="1" i="1" dirty="0">
+                <a:solidFill>
+                  <a:schemeClr val="tx1"/>
+                </a:solidFill>
+                <a:latin typeface="Arial" panose="020B0604020202020204" pitchFamily="34" charset="0"/>
+                <a:cs typeface="Arial" panose="020B0604020202020204" pitchFamily="34" charset="0"/>
+              </a:rPr>
+              <a:t>Soil moisture</a:t>
+            </a:r>
+            <a:endParaRPr lang="en-US" sz="2400" b="1" dirty="0">
+              <a:solidFill>
+                <a:schemeClr val="tx1"/>
+              </a:solidFill>
+              <a:latin typeface="Arial" panose="020B0604020202020204" pitchFamily="34" charset="0"/>
+              <a:cs typeface="Arial" panose="020B0604020202020204" pitchFamily="34" charset="0"/>
+            </a:endParaRPr>
+          </a:p>
+        </p:txBody>
+      </p:sp>
+      <p:cxnSp>
+        <p:nvCxnSpPr>
+          <p:cNvPr id="14" name="Straight Arrow Connector 13">
+            <a:extLst>
+              <a:ext uri="{FF2B5EF4-FFF2-40B4-BE49-F238E27FC236}">
+                <a16:creationId xmlns:a16="http://schemas.microsoft.com/office/drawing/2014/main" id="{66D68CAF-D7E4-8715-DD1A-76CC6EE64D02}"/>
+              </a:ext>
+            </a:extLst>
+          </p:cNvPr>
+          <p:cNvCxnSpPr>
+            <a:cxnSpLocks/>
+            <a:stCxn id="20" idx="2"/>
+          </p:cNvCxnSpPr>
+          <p:nvPr/>
+        </p:nvCxnSpPr>
+        <p:spPr>
+          <a:xfrm>
+            <a:off x="14732884" y="3230103"/>
+            <a:ext cx="0" cy="1480815"/>
+          </a:xfrm>
+          <a:prstGeom prst="straightConnector1">
+            <a:avLst/>
+          </a:prstGeom>
+          <a:ln w="61214">
+            <a:solidFill>
+              <a:srgbClr val="C00000"/>
+            </a:solidFill>
+            <a:headEnd type="oval"/>
+            <a:tailEnd type="triangle"/>
+          </a:ln>
+        </p:spPr>
+        <p:style>
+          <a:lnRef idx="1">
+            <a:schemeClr val="accent1"/>
+          </a:lnRef>
+          <a:fillRef idx="0">
+            <a:schemeClr val="accent1"/>
+          </a:fillRef>
+          <a:effectRef idx="0">
+            <a:schemeClr val="accent1"/>
+          </a:effectRef>
+          <a:fontRef idx="minor">
+            <a:schemeClr val="tx1"/>
+          </a:fontRef>
+        </p:style>
+      </p:cxnSp>
+      <p:sp>
+        <p:nvSpPr>
+          <p:cNvPr id="20" name="Rectangle 19">
+            <a:extLst>
+              <a:ext uri="{FF2B5EF4-FFF2-40B4-BE49-F238E27FC236}">
+                <a16:creationId xmlns:a16="http://schemas.microsoft.com/office/drawing/2014/main" id="{A63B3748-DB09-BACF-29F8-3CBE12A4D11C}"/>
+              </a:ext>
+            </a:extLst>
+          </p:cNvPr>
+          <p:cNvSpPr/>
+          <p:nvPr/>
+        </p:nvSpPr>
+        <p:spPr>
+          <a:xfrm>
+            <a:off x="13823185" y="2352880"/>
+            <a:ext cx="1819398" cy="877223"/>
+          </a:xfrm>
+          <a:prstGeom prst="rect">
+            <a:avLst/>
+          </a:prstGeom>
+          <a:solidFill>
+            <a:schemeClr val="bg1"/>
+          </a:solidFill>
+          <a:ln w="38100">
+            <a:solidFill>
+              <a:schemeClr val="tx1"/>
+            </a:solidFill>
+          </a:ln>
+        </p:spPr>
+        <p:style>
+          <a:lnRef idx="2">
+            <a:schemeClr val="accent1">
+              <a:shade val="50000"/>
+            </a:schemeClr>
+          </a:lnRef>
+          <a:fillRef idx="1">
+            <a:schemeClr val="accent1"/>
+          </a:fillRef>
+          <a:effectRef idx="0">
+            <a:schemeClr val="accent1"/>
+          </a:effectRef>
+          <a:fontRef idx="minor">
+            <a:schemeClr val="lt1"/>
+          </a:fontRef>
+        </p:style>
+        <p:txBody>
+          <a:bodyPr rtlCol="0" anchor="ctr"/>
+          <a:lstStyle/>
+          <a:p>
+            <a:pPr algn="ctr"/>
+            <a:r>
+              <a:rPr lang="en-US" sz="2400" b="1" i="1" dirty="0">
+                <a:solidFill>
+                  <a:schemeClr val="tx1"/>
+                </a:solidFill>
+                <a:latin typeface="Arial" panose="020B0604020202020204" pitchFamily="34" charset="0"/>
+                <a:cs typeface="Arial" panose="020B0604020202020204" pitchFamily="34" charset="0"/>
+              </a:rPr>
+              <a:t>VPD</a:t>
+            </a:r>
+            <a:r>
+              <a:rPr lang="en-US" sz="2400" b="1" i="1" baseline="-25000" dirty="0">
+                <a:solidFill>
+                  <a:schemeClr val="tx1"/>
+                </a:solidFill>
+                <a:latin typeface="Arial" panose="020B0604020202020204" pitchFamily="34" charset="0"/>
+                <a:cs typeface="Arial" panose="020B0604020202020204" pitchFamily="34" charset="0"/>
+              </a:rPr>
+              <a:t>90</a:t>
+            </a:r>
+            <a:endParaRPr lang="en-US" sz="2400" b="1" dirty="0">
+              <a:solidFill>
+                <a:schemeClr val="tx1"/>
+              </a:solidFill>
+              <a:latin typeface="Arial" panose="020B0604020202020204" pitchFamily="34" charset="0"/>
+              <a:cs typeface="Arial" panose="020B0604020202020204" pitchFamily="34" charset="0"/>
+            </a:endParaRPr>
+          </a:p>
+        </p:txBody>
+      </p:sp>
+      <p:cxnSp>
+        <p:nvCxnSpPr>
+          <p:cNvPr id="24" name="Straight Arrow Connector 23">
+            <a:extLst>
+              <a:ext uri="{FF2B5EF4-FFF2-40B4-BE49-F238E27FC236}">
+                <a16:creationId xmlns:a16="http://schemas.microsoft.com/office/drawing/2014/main" id="{1F13C262-DB58-7915-83D1-38A23203A294}"/>
+              </a:ext>
+            </a:extLst>
+          </p:cNvPr>
+          <p:cNvCxnSpPr>
+            <a:stCxn id="25" idx="2"/>
+          </p:cNvCxnSpPr>
+          <p:nvPr/>
+        </p:nvCxnSpPr>
+        <p:spPr>
+          <a:xfrm flipH="1">
+            <a:off x="14727049" y="10860524"/>
+            <a:ext cx="5835" cy="1523265"/>
+          </a:xfrm>
+          <a:prstGeom prst="straightConnector1">
+            <a:avLst/>
+          </a:prstGeom>
+          <a:ln w="61214">
+            <a:solidFill>
+              <a:srgbClr val="C00000"/>
+            </a:solidFill>
+            <a:headEnd type="oval"/>
+            <a:tailEnd type="triangle"/>
+          </a:ln>
+        </p:spPr>
+        <p:style>
+          <a:lnRef idx="1">
+            <a:schemeClr val="accent1"/>
+          </a:lnRef>
+          <a:fillRef idx="0">
+            <a:schemeClr val="accent1"/>
+          </a:fillRef>
+          <a:effectRef idx="0">
+            <a:schemeClr val="accent1"/>
+          </a:effectRef>
+          <a:fontRef idx="minor">
+            <a:schemeClr val="tx1"/>
+          </a:fontRef>
+        </p:style>
+      </p:cxnSp>
+      <p:sp>
+        <p:nvSpPr>
+          <p:cNvPr id="25" name="Rectangle 24">
+            <a:extLst>
+              <a:ext uri="{FF2B5EF4-FFF2-40B4-BE49-F238E27FC236}">
+                <a16:creationId xmlns:a16="http://schemas.microsoft.com/office/drawing/2014/main" id="{7B514C3B-3E3F-BB77-3FAB-B1A67A2641A0}"/>
+              </a:ext>
+            </a:extLst>
+          </p:cNvPr>
+          <p:cNvSpPr/>
+          <p:nvPr/>
+        </p:nvSpPr>
+        <p:spPr>
+          <a:xfrm>
+            <a:off x="13823185" y="9983301"/>
+            <a:ext cx="1819398" cy="877223"/>
+          </a:xfrm>
+          <a:prstGeom prst="rect">
+            <a:avLst/>
+          </a:prstGeom>
+          <a:solidFill>
+            <a:schemeClr val="bg1"/>
+          </a:solidFill>
+          <a:ln w="38100">
+            <a:solidFill>
+              <a:schemeClr val="tx1"/>
+            </a:solidFill>
+          </a:ln>
+        </p:spPr>
+        <p:style>
+          <a:lnRef idx="2">
+            <a:schemeClr val="accent1">
+              <a:shade val="50000"/>
+            </a:schemeClr>
+          </a:lnRef>
+          <a:fillRef idx="1">
+            <a:schemeClr val="accent1"/>
+          </a:fillRef>
+          <a:effectRef idx="0">
+            <a:schemeClr val="accent1"/>
+          </a:effectRef>
+          <a:fontRef idx="minor">
+            <a:schemeClr val="lt1"/>
+          </a:fontRef>
+        </p:style>
+        <p:txBody>
+          <a:bodyPr rtlCol="0" anchor="ctr"/>
+          <a:lstStyle/>
+          <a:p>
+            <a:pPr algn="ctr"/>
+            <a:r>
+              <a:rPr lang="en-US" sz="2400" b="1" i="1" dirty="0">
+                <a:solidFill>
+                  <a:schemeClr val="tx1"/>
+                </a:solidFill>
+                <a:latin typeface="Arial" panose="020B0604020202020204" pitchFamily="34" charset="0"/>
+                <a:cs typeface="Arial" panose="020B0604020202020204" pitchFamily="34" charset="0"/>
+              </a:rPr>
+              <a:t>VPD</a:t>
+            </a:r>
+            <a:r>
+              <a:rPr lang="en-US" sz="2400" b="1" i="1" baseline="-25000" dirty="0">
+                <a:solidFill>
+                  <a:schemeClr val="tx1"/>
+                </a:solidFill>
+                <a:latin typeface="Arial" panose="020B0604020202020204" pitchFamily="34" charset="0"/>
+                <a:cs typeface="Arial" panose="020B0604020202020204" pitchFamily="34" charset="0"/>
+              </a:rPr>
+              <a:t>60</a:t>
+            </a:r>
+            <a:endParaRPr lang="en-US" sz="2400" b="1" dirty="0">
+              <a:solidFill>
+                <a:schemeClr val="tx1"/>
+              </a:solidFill>
+              <a:latin typeface="Arial" panose="020B0604020202020204" pitchFamily="34" charset="0"/>
+              <a:cs typeface="Arial" panose="020B0604020202020204" pitchFamily="34" charset="0"/>
+            </a:endParaRPr>
+          </a:p>
+        </p:txBody>
+      </p:sp>
+    </p:spTree>
+    <p:extLst>
+      <p:ext uri="{BB962C8B-B14F-4D97-AF65-F5344CB8AC3E}">
+        <p14:creationId xmlns:p14="http://schemas.microsoft.com/office/powerpoint/2010/main" val="1566106983"/>
+      </p:ext>
+    </p:extLst>
+  </p:cSld>
+  <p:clrMapOvr>
+    <a:masterClrMapping/>
+  </p:clrMapOvr>
+</p:sld>
+</file>
+
 <file path=ppt/theme/theme1.xml><?xml version="1.0" encoding="utf-8"?>
 <a:theme xmlns:a="http://schemas.openxmlformats.org/drawingml/2006/main" name="Office Theme">
   <a:themeElements>

</xml_diff>